<commit_message>
Add GitHub repo to slidedeck
</commit_message>
<xml_diff>
--- a/The lazy and easily distracted report writer.pptx
+++ b/The lazy and easily distracted report writer.pptx
@@ -2216,7 +2216,7 @@
           </a:ln>
           <a:extLst>
             <a:ext uri="{C572A759-6A51-4108-AA02-DFA0A04FC94B}">
-              <ma14:wrappingTextBoxFlag xmlns="" xmlns:m="http://schemas.openxmlformats.org/officeDocument/2006/math" xmlns:a14="http://schemas.microsoft.com/office/drawing/2010/main" xmlns:ma14="http://schemas.microsoft.com/office/mac/drawingml/2011/main" val="1"/>
+              <ma14:wrappingTextBoxFlag xmlns:ma14="http://schemas.microsoft.com/office/mac/drawingml/2011/main" xmlns:a14="http://schemas.microsoft.com/office/drawing/2010/main" xmlns:m="http://schemas.openxmlformats.org/officeDocument/2006/math" xmlns="" val="1"/>
             </a:ext>
           </a:extLst>
         </p:spPr>
@@ -2255,7 +2255,7 @@
           </a:ln>
           <a:extLst>
             <a:ext uri="{C572A759-6A51-4108-AA02-DFA0A04FC94B}">
-              <ma14:wrappingTextBoxFlag xmlns="" xmlns:m="http://schemas.openxmlformats.org/officeDocument/2006/math" xmlns:a14="http://schemas.microsoft.com/office/drawing/2010/main" xmlns:ma14="http://schemas.microsoft.com/office/mac/drawingml/2011/main" val="1"/>
+              <ma14:wrappingTextBoxFlag xmlns:ma14="http://schemas.microsoft.com/office/mac/drawingml/2011/main" xmlns:a14="http://schemas.microsoft.com/office/drawing/2010/main" xmlns:m="http://schemas.openxmlformats.org/officeDocument/2006/math" xmlns="" val="1"/>
             </a:ext>
           </a:extLst>
         </p:spPr>
@@ -5910,22 +5910,14 @@
             </a:r>
             <a:r>
               <a:rPr lang="en-GB" dirty="0" smtClean="0"/>
-              <a:t> </a:t>
-            </a:r>
-            <a:r>
-              <a:rPr lang="en-GB" dirty="0" smtClean="0"/>
-              <a:t>scripts</a:t>
+              <a:t> scripts</a:t>
             </a:r>
             <a:br>
               <a:rPr lang="en-GB" dirty="0" smtClean="0"/>
             </a:br>
             <a:r>
               <a:rPr lang="en-GB" b="1" i="1" dirty="0" smtClean="0"/>
-              <a:t>(</a:t>
-            </a:r>
-            <a:r>
-              <a:rPr lang="en-GB" b="1" i="1" dirty="0" smtClean="0"/>
-              <a:t>for analysis)</a:t>
+              <a:t>(for analysis)</a:t>
             </a:r>
             <a:endParaRPr b="1" i="1" dirty="0"/>
           </a:p>
@@ -9544,23 +9536,7 @@
                   <a:cs typeface="Courier New" panose="02070309020205020404" pitchFamily="49" charset="0"/>
                   <a:sym typeface="Calibri"/>
                 </a:rPr>
-                <a:t> = </a:t>
-              </a:r>
-              <a:r>
-                <a:rPr kumimoji="0" lang="en-GB" sz="1800" b="1" i="0" u="none" strike="noStrike" cap="none" spc="0" normalizeH="0" dirty="0" smtClean="0">
-                  <a:ln>
-                    <a:noFill/>
-                  </a:ln>
-                  <a:solidFill>
-                    <a:srgbClr val="000000"/>
-                  </a:solidFill>
-                  <a:effectLst/>
-                  <a:uFillTx/>
-                  <a:latin typeface="Courier New" panose="02070309020205020404" pitchFamily="49" charset="0"/>
-                  <a:cs typeface="Courier New" panose="02070309020205020404" pitchFamily="49" charset="0"/>
-                  <a:sym typeface="Calibri"/>
-                </a:rPr>
-                <a:t>TRUE</a:t>
+                <a:t> = TRUE</a:t>
               </a:r>
               <a:r>
                 <a:rPr kumimoji="0" lang="en-GB" sz="1800" b="0" i="0" u="none" strike="noStrike" cap="none" spc="0" normalizeH="0" dirty="0" smtClean="0">
@@ -11303,24 +11279,7 @@
                 <a:cs typeface="+mn-cs"/>
                 <a:sym typeface="Calibri"/>
               </a:rPr>
-              <a:t>age) to </a:t>
-            </a:r>
-            <a:r>
-              <a:rPr kumimoji="0" lang="en-GB" sz="1800" b="0" i="0" u="none" strike="noStrike" cap="none" spc="0" normalizeH="0" baseline="0" dirty="0" smtClean="0">
-                <a:ln>
-                  <a:noFill/>
-                </a:ln>
-                <a:solidFill>
-                  <a:srgbClr val="000000"/>
-                </a:solidFill>
-                <a:effectLst/>
-                <a:uFillTx/>
-                <a:latin typeface="+mn-lt"/>
-                <a:ea typeface="+mn-ea"/>
-                <a:cs typeface="+mn-cs"/>
-                <a:sym typeface="Calibri"/>
-              </a:rPr>
-              <a:t>specify parameters and render a parameterised report </a:t>
+              <a:t>age) to specify parameters and render a parameterised report </a:t>
             </a:r>
             <a:r>
               <a:rPr lang="en-GB" dirty="0" smtClean="0"/>
@@ -11377,20 +11336,6 @@
               </a:rPr>
               <a:t>.</a:t>
             </a:r>
-            <a:endParaRPr kumimoji="0" lang="en-GB" sz="1800" b="0" i="0" u="none" strike="noStrike" cap="none" spc="0" normalizeH="0" baseline="0" dirty="0" smtClean="0">
-              <a:ln>
-                <a:noFill/>
-              </a:ln>
-              <a:solidFill>
-                <a:srgbClr val="000000"/>
-              </a:solidFill>
-              <a:effectLst/>
-              <a:uFillTx/>
-              <a:latin typeface="+mn-lt"/>
-              <a:ea typeface="+mn-ea"/>
-              <a:cs typeface="+mn-cs"/>
-              <a:sym typeface="Calibri"/>
-            </a:endParaRPr>
           </a:p>
           <a:p>
             <a:pPr marL="0" marR="0" indent="0" algn="l" defTabSz="914400" rtl="0" fontAlgn="auto" latinLnBrk="0" hangingPunct="0">
@@ -11443,10 +11388,10 @@
                 <a:cs typeface="+mn-cs"/>
                 <a:sym typeface="Calibri"/>
               </a:rPr>
-              <a:t>You </a:t>
-            </a:r>
-            <a:r>
-              <a:rPr kumimoji="0" lang="en-GB" sz="1800" b="0" i="0" u="none" strike="noStrike" cap="none" spc="0" normalizeH="0" baseline="0" dirty="0" smtClean="0">
+              <a:t>You can</a:t>
+            </a:r>
+            <a:r>
+              <a:rPr kumimoji="0" lang="en-GB" sz="1800" b="0" i="0" u="none" strike="noStrike" cap="none" spc="0" normalizeH="0" dirty="0" smtClean="0">
                 <a:ln>
                   <a:noFill/>
                 </a:ln>
@@ -11460,56 +11405,8 @@
                 <a:cs typeface="+mn-cs"/>
                 <a:sym typeface="Calibri"/>
               </a:rPr>
-              <a:t>can</a:t>
-            </a:r>
-            <a:r>
-              <a:rPr kumimoji="0" lang="en-GB" sz="1800" b="0" i="0" u="none" strike="noStrike" cap="none" spc="0" normalizeH="0" dirty="0" smtClean="0">
-                <a:ln>
-                  <a:noFill/>
-                </a:ln>
-                <a:solidFill>
-                  <a:srgbClr val="000000"/>
-                </a:solidFill>
-                <a:effectLst/>
-                <a:uFillTx/>
-                <a:latin typeface="+mn-lt"/>
-                <a:ea typeface="+mn-ea"/>
-                <a:cs typeface="+mn-cs"/>
-                <a:sym typeface="Calibri"/>
-              </a:rPr>
-              <a:t> </a:t>
-            </a:r>
-            <a:r>
-              <a:rPr kumimoji="0" lang="en-GB" sz="1800" b="0" i="0" u="none" strike="noStrike" cap="none" spc="0" normalizeH="0" dirty="0" smtClean="0">
-                <a:ln>
-                  <a:noFill/>
-                </a:ln>
-                <a:solidFill>
-                  <a:srgbClr val="000000"/>
-                </a:solidFill>
-                <a:effectLst/>
-                <a:uFillTx/>
-                <a:latin typeface="+mn-lt"/>
-                <a:ea typeface="+mn-ea"/>
-                <a:cs typeface="+mn-cs"/>
-                <a:sym typeface="Calibri"/>
-              </a:rPr>
-              <a:t>then have</a:t>
-            </a:r>
-            <a:endParaRPr kumimoji="0" lang="en-GB" sz="1800" b="0" i="0" u="none" strike="noStrike" cap="none" spc="0" normalizeH="0" dirty="0" smtClean="0">
-              <a:ln>
-                <a:noFill/>
-              </a:ln>
-              <a:solidFill>
-                <a:srgbClr val="000000"/>
-              </a:solidFill>
-              <a:effectLst/>
-              <a:uFillTx/>
-              <a:latin typeface="+mn-lt"/>
-              <a:ea typeface="+mn-ea"/>
-              <a:cs typeface="+mn-cs"/>
-              <a:sym typeface="Calibri"/>
-            </a:endParaRPr>
+              <a:t> then have</a:t>
+            </a:r>
           </a:p>
           <a:p>
             <a:pPr marL="0" marR="0" indent="0" algn="l" defTabSz="914400" rtl="0" fontAlgn="auto" latinLnBrk="0" hangingPunct="0">
@@ -12012,7 +11909,7 @@
           </a:ln>
           <a:extLst>
             <a:ext uri="{C572A759-6A51-4108-AA02-DFA0A04FC94B}">
-              <ma14:wrappingTextBoxFlag xmlns="" xmlns:m="http://schemas.openxmlformats.org/officeDocument/2006/math" xmlns:a14="http://schemas.microsoft.com/office/drawing/2010/main" xmlns:ma14="http://schemas.microsoft.com/office/mac/drawingml/2011/main" val="1"/>
+              <ma14:wrappingTextBoxFlag xmlns:ma14="http://schemas.microsoft.com/office/mac/drawingml/2011/main" xmlns:a14="http://schemas.microsoft.com/office/drawing/2010/main" xmlns:m="http://schemas.openxmlformats.org/officeDocument/2006/math" xmlns="" val="1"/>
             </a:ext>
           </a:extLst>
         </p:spPr>
@@ -12051,7 +11948,7 @@
           </a:ln>
           <a:extLst>
             <a:ext uri="{C572A759-6A51-4108-AA02-DFA0A04FC94B}">
-              <ma14:wrappingTextBoxFlag xmlns="" xmlns:m="http://schemas.openxmlformats.org/officeDocument/2006/math" xmlns:a14="http://schemas.microsoft.com/office/drawing/2010/main" xmlns:ma14="http://schemas.microsoft.com/office/mac/drawingml/2011/main" val="1"/>
+              <ma14:wrappingTextBoxFlag xmlns:ma14="http://schemas.microsoft.com/office/mac/drawingml/2011/main" xmlns:a14="http://schemas.microsoft.com/office/drawing/2010/main" xmlns:m="http://schemas.openxmlformats.org/officeDocument/2006/math" xmlns="" val="1"/>
             </a:ext>
           </a:extLst>
         </p:spPr>
@@ -12408,6 +12305,67 @@
                 <a:sym typeface="Calibri"/>
               </a:rPr>
               <a:t>MikeKSmith</a:t>
+            </a:r>
+            <a:endParaRPr kumimoji="0" lang="en-GB" sz="1800" b="0" i="0" u="none" strike="noStrike" cap="none" spc="0" normalizeH="0" baseline="0" dirty="0">
+              <a:ln>
+                <a:noFill/>
+              </a:ln>
+              <a:solidFill>
+                <a:srgbClr val="000000"/>
+              </a:solidFill>
+              <a:effectLst/>
+              <a:uFillTx/>
+              <a:latin typeface="+mn-lt"/>
+              <a:ea typeface="+mn-ea"/>
+              <a:cs typeface="+mn-cs"/>
+              <a:sym typeface="Calibri"/>
+            </a:endParaRPr>
+          </a:p>
+        </p:txBody>
+      </p:sp>
+      <p:sp>
+        <p:nvSpPr>
+          <p:cNvPr id="2" name="TextBox 1"/>
+          <p:cNvSpPr txBox="1"/>
+          <p:nvPr/>
+        </p:nvSpPr>
+        <p:spPr>
+          <a:xfrm>
+            <a:off x="179512" y="6228022"/>
+            <a:ext cx="4830808" cy="369330"/>
+          </a:xfrm>
+          <a:prstGeom prst="rect">
+            <a:avLst/>
+          </a:prstGeom>
+          <a:noFill/>
+          <a:ln w="12700" cap="flat">
+            <a:noFill/>
+            <a:miter lim="400000"/>
+          </a:ln>
+          <a:effectLst/>
+          <a:sp3d/>
+        </p:spPr>
+        <p:style>
+          <a:lnRef idx="0">
+            <a:scrgbClr r="0" g="0" b="0"/>
+          </a:lnRef>
+          <a:fillRef idx="0">
+            <a:scrgbClr r="0" g="0" b="0"/>
+          </a:fillRef>
+          <a:effectRef idx="0">
+            <a:scrgbClr r="0" g="0" b="0"/>
+          </a:effectRef>
+          <a:fontRef idx="none"/>
+        </p:style>
+        <p:txBody>
+          <a:bodyPr rot="0" spcFirstLastPara="1" vertOverflow="overflow" horzOverflow="overflow" vert="horz" wrap="none" lIns="45719" tIns="45719" rIns="45719" bIns="45719" numCol="1" spcCol="38100" rtlCol="0" anchor="t">
+            <a:spAutoFit/>
+          </a:bodyPr>
+          <a:lstStyle/>
+          <a:p>
+            <a:r>
+              <a:rPr lang="en-GB" dirty="0"/>
+              <a:t>https://github.com/MikeKSmith/RStudioConf2019</a:t>
             </a:r>
             <a:endParaRPr kumimoji="0" lang="en-GB" sz="1800" b="0" i="0" u="none" strike="noStrike" cap="none" spc="0" normalizeH="0" baseline="0" dirty="0">
               <a:ln>

</xml_diff>

<commit_message>
Add additional question using render function with parameters
</commit_message>
<xml_diff>
--- a/The lazy and easily distracted report writer.pptx
+++ b/The lazy and easily distracted report writer.pptx
@@ -4889,7 +4889,7 @@
           </a:ln>
           <a:extLst>
             <a:ext uri="{C572A759-6A51-4108-AA02-DFA0A04FC94B}">
-              <ma14:wrappingTextBoxFlag xmlns="" xmlns:m="http://schemas.openxmlformats.org/officeDocument/2006/math" xmlns:a14="http://schemas.microsoft.com/office/drawing/2010/main" xmlns:ma14="http://schemas.microsoft.com/office/mac/drawingml/2011/main" val="1"/>
+              <ma14:wrappingTextBoxFlag xmlns:ma14="http://schemas.microsoft.com/office/mac/drawingml/2011/main" xmlns:a14="http://schemas.microsoft.com/office/drawing/2010/main" xmlns:m="http://schemas.openxmlformats.org/officeDocument/2006/math" xmlns="" val="1"/>
             </a:ext>
           </a:extLst>
         </p:spPr>
@@ -4928,7 +4928,7 @@
           </a:ln>
           <a:extLst>
             <a:ext uri="{C572A759-6A51-4108-AA02-DFA0A04FC94B}">
-              <ma14:wrappingTextBoxFlag xmlns="" xmlns:m="http://schemas.openxmlformats.org/officeDocument/2006/math" xmlns:a14="http://schemas.microsoft.com/office/drawing/2010/main" xmlns:ma14="http://schemas.microsoft.com/office/mac/drawingml/2011/main" val="1"/>
+              <ma14:wrappingTextBoxFlag xmlns:ma14="http://schemas.microsoft.com/office/mac/drawingml/2011/main" xmlns:a14="http://schemas.microsoft.com/office/drawing/2010/main" xmlns:m="http://schemas.openxmlformats.org/officeDocument/2006/math" xmlns="" val="1"/>
             </a:ext>
           </a:extLst>
         </p:spPr>
@@ -7977,15 +7977,7 @@
             </a:pPr>
             <a:r>
               <a:rPr lang="en-GB" sz="4000" b="1" i="1" dirty="0" smtClean="0"/>
-              <a:t>&lt; </a:t>
-            </a:r>
-            <a:r>
-              <a:rPr lang="en-GB" sz="4000" b="1" i="1" dirty="0" smtClean="0"/>
-              <a:t>6 </a:t>
-            </a:r>
-            <a:r>
-              <a:rPr lang="en-GB" sz="4000" b="1" i="1" dirty="0" smtClean="0"/>
-              <a:t>months pass &gt;</a:t>
+              <a:t>&lt; 6 months pass &gt;</a:t>
             </a:r>
           </a:p>
           <a:p>
@@ -8555,11 +8547,7 @@
             </a:r>
             <a:r>
               <a:rPr lang="en-GB" dirty="0" smtClean="0"/>
-              <a:t>(6 </a:t>
-            </a:r>
-            <a:r>
-              <a:rPr lang="en-GB" dirty="0" smtClean="0"/>
-              <a:t>months later) </a:t>
+              <a:t>(6 months later) </a:t>
             </a:r>
             <a:r>
               <a:rPr b="1" i="1" dirty="0" smtClean="0"/>
@@ -9365,11 +9353,7 @@
             </a:pPr>
             <a:r>
               <a:rPr dirty="0" smtClean="0"/>
-              <a:t>Clinical </a:t>
-            </a:r>
-            <a:r>
-              <a:rPr dirty="0" smtClean="0"/>
-              <a:t>Pharmacologist</a:t>
+              <a:t>Clinical Pharmacologist</a:t>
             </a:r>
             <a:r>
               <a:rPr lang="en-GB" dirty="0" smtClean="0"/>
@@ -14766,9 +14750,75 @@
         </p:spPr>
         <p:txBody>
           <a:bodyPr>
-            <a:normAutofit lnSpcReduction="10000"/>
+            <a:normAutofit fontScale="92500" lnSpcReduction="20000"/>
           </a:bodyPr>
           <a:lstStyle/>
+          <a:p>
+            <a:pPr marL="264032" indent="-264032" defTabSz="704087">
+              <a:spcBef>
+                <a:spcPts val="500"/>
+              </a:spcBef>
+              <a:defRPr sz="2464"/>
+            </a:pPr>
+            <a:r>
+              <a:rPr lang="en-GB" dirty="0" smtClean="0"/>
+              <a:t>Question: Can I pass in parameters from the render command?</a:t>
+            </a:r>
+          </a:p>
+          <a:p>
+            <a:pPr marL="704903" lvl="1" indent="-264032" defTabSz="704087">
+              <a:spcBef>
+                <a:spcPts val="500"/>
+              </a:spcBef>
+              <a:defRPr sz="2464"/>
+            </a:pPr>
+            <a:r>
+              <a:rPr lang="en-GB" dirty="0" smtClean="0"/>
+              <a:t>You </a:t>
+            </a:r>
+            <a:r>
+              <a:rPr lang="en-GB" dirty="0" err="1" smtClean="0"/>
+              <a:t>betcha</a:t>
+            </a:r>
+            <a:r>
+              <a:rPr lang="en-GB" dirty="0" smtClean="0"/>
+              <a:t>! As </a:t>
+            </a:r>
+            <a:r>
+              <a:rPr lang="en-GB" b="1" dirty="0" smtClean="0">
+                <a:latin typeface="Courier New" panose="02070309020205020404" pitchFamily="49" charset="0"/>
+                <a:cs typeface="Courier New" panose="02070309020205020404" pitchFamily="49" charset="0"/>
+              </a:rPr>
+              <a:t>render(… , </a:t>
+            </a:r>
+            <a:r>
+              <a:rPr lang="en-GB" b="1" dirty="0" err="1" smtClean="0">
+                <a:latin typeface="Courier New" panose="02070309020205020404" pitchFamily="49" charset="0"/>
+                <a:cs typeface="Courier New" panose="02070309020205020404" pitchFamily="49" charset="0"/>
+              </a:rPr>
+              <a:t>params</a:t>
+            </a:r>
+            <a:r>
+              <a:rPr lang="en-GB" b="1" dirty="0" smtClean="0">
+                <a:latin typeface="Courier New" panose="02070309020205020404" pitchFamily="49" charset="0"/>
+                <a:cs typeface="Courier New" panose="02070309020205020404" pitchFamily="49" charset="0"/>
+              </a:rPr>
+              <a:t>=list( …  ) )</a:t>
+            </a:r>
+            <a:endParaRPr lang="en-GB" b="1" dirty="0" smtClean="0">
+              <a:latin typeface="Courier New" panose="02070309020205020404" pitchFamily="49" charset="0"/>
+              <a:cs typeface="Courier New" panose="02070309020205020404" pitchFamily="49" charset="0"/>
+            </a:endParaRPr>
+          </a:p>
+          <a:p>
+            <a:pPr marL="264032" indent="-264032" defTabSz="704087">
+              <a:spcBef>
+                <a:spcPts val="500"/>
+              </a:spcBef>
+              <a:defRPr sz="2464"/>
+            </a:pPr>
+            <a:endParaRPr lang="en-GB" dirty="0"/>
+          </a:p>
           <a:p>
             <a:pPr marL="264032" indent="-264032" defTabSz="704087">
               <a:spcBef>
@@ -14965,7 +15015,7 @@
           </a:ln>
           <a:extLst>
             <a:ext uri="{C572A759-6A51-4108-AA02-DFA0A04FC94B}">
-              <ma14:wrappingTextBoxFlag xmlns="" xmlns:m="http://schemas.openxmlformats.org/officeDocument/2006/math" xmlns:a14="http://schemas.microsoft.com/office/drawing/2010/main" xmlns:ma14="http://schemas.microsoft.com/office/mac/drawingml/2011/main" val="1"/>
+              <ma14:wrappingTextBoxFlag xmlns:ma14="http://schemas.microsoft.com/office/mac/drawingml/2011/main" xmlns:a14="http://schemas.microsoft.com/office/drawing/2010/main" xmlns:m="http://schemas.openxmlformats.org/officeDocument/2006/math" xmlns="" val="1"/>
             </a:ext>
           </a:extLst>
         </p:spPr>
@@ -15004,7 +15054,7 @@
           </a:ln>
           <a:extLst>
             <a:ext uri="{C572A759-6A51-4108-AA02-DFA0A04FC94B}">
-              <ma14:wrappingTextBoxFlag xmlns="" xmlns:m="http://schemas.openxmlformats.org/officeDocument/2006/math" xmlns:a14="http://schemas.microsoft.com/office/drawing/2010/main" xmlns:ma14="http://schemas.microsoft.com/office/mac/drawingml/2011/main" val="1"/>
+              <ma14:wrappingTextBoxFlag xmlns:ma14="http://schemas.microsoft.com/office/mac/drawingml/2011/main" xmlns:a14="http://schemas.microsoft.com/office/drawing/2010/main" xmlns:m="http://schemas.openxmlformats.org/officeDocument/2006/math" xmlns="" val="1"/>
             </a:ext>
           </a:extLst>
         </p:spPr>
@@ -16615,15 +16665,7 @@
                   <a:srgbClr val="FF0000"/>
                 </a:solidFill>
               </a:rPr>
-              <a:t>unique to me alone</a:t>
-            </a:r>
-            <a:r>
-              <a:rPr lang="en-GB" sz="3200" b="1" i="1" dirty="0" smtClean="0">
-                <a:solidFill>
-                  <a:srgbClr val="FF0000"/>
-                </a:solidFill>
-              </a:rPr>
-              <a:t>.</a:t>
+              <a:t>unique to me alone.</a:t>
             </a:r>
             <a:r>
               <a:rPr lang="en-GB" sz="3200" dirty="0" smtClean="0">
@@ -16633,11 +16675,6 @@
               </a:rPr>
               <a:t>)</a:t>
             </a:r>
-            <a:endParaRPr lang="en-GB" sz="3200" dirty="0" smtClean="0">
-              <a:solidFill>
-                <a:schemeClr val="tx1"/>
-              </a:solidFill>
-            </a:endParaRPr>
           </a:p>
           <a:p>
             <a:pPr defTabSz="576072" hangingPunct="1">

</xml_diff>

<commit_message>
Updated Keynote to match PPT and PDF
</commit_message>
<xml_diff>
--- a/The lazy and easily distracted report writer.pptx
+++ b/The lazy and easily distracted report writer.pptx
@@ -10,10 +10,10 @@
   <p:sldIdLst>
     <p:sldId id="256" r:id="rId2"/>
     <p:sldId id="257" r:id="rId3"/>
-    <p:sldId id="258" r:id="rId4"/>
-    <p:sldId id="259" r:id="rId5"/>
-    <p:sldId id="260" r:id="rId6"/>
-    <p:sldId id="261" r:id="rId7"/>
+    <p:sldId id="259" r:id="rId4"/>
+    <p:sldId id="260" r:id="rId5"/>
+    <p:sldId id="261" r:id="rId6"/>
+    <p:sldId id="303" r:id="rId7"/>
     <p:sldId id="292" r:id="rId8"/>
     <p:sldId id="279" r:id="rId9"/>
     <p:sldId id="281" r:id="rId10"/>
@@ -2510,24 +2510,36 @@
           <a:p>
             <a:r>
               <a:rPr lang="en-GB" dirty="0" smtClean="0"/>
-              <a:t>Here’s a quote from Chris Atherton,</a:t>
+              <a:t>To illustrate this</a:t>
             </a:r>
             <a:r>
               <a:rPr lang="en-GB" baseline="0" dirty="0" smtClean="0"/>
-              <a:t> who has a PhD in neuroscience and was until fairly recently an academic working in the field of cognitive load</a:t>
-            </a:r>
+              <a:t> point, let me show you some cutlery drawers.</a:t>
+            </a:r>
+          </a:p>
+          <a:p>
             <a:r>
               <a:rPr lang="en-GB" baseline="0" dirty="0" smtClean="0"/>
-              <a:t>.</a:t>
-            </a:r>
-            <a:endParaRPr lang="en-GB" baseline="0" dirty="0" smtClean="0"/>
+              <a:t>These are cutlery drawers of some folks that you might encounter at this conference and they were shared on Twitter and they sparked a debate about cutlery drawer organisation…</a:t>
+            </a:r>
+          </a:p>
+          <a:p>
+            <a:r>
+              <a:rPr lang="en-GB" baseline="0" dirty="0" smtClean="0"/>
+              <a:t>Do knives go on the left, or right, do you parse out large and small forks and spoons. </a:t>
+            </a:r>
+            <a:r>
+              <a:rPr lang="en-GB" baseline="0" dirty="0" smtClean="0"/>
+              <a:t>Do you organise by frequency of use? That kind of thing. Take a moment to consider your own cutlery drawer….</a:t>
+            </a:r>
+            <a:endParaRPr lang="en-GB" dirty="0"/>
           </a:p>
         </p:txBody>
       </p:sp>
     </p:spTree>
     <p:extLst>
       <p:ext uri="{BB962C8B-B14F-4D97-AF65-F5344CB8AC3E}">
-        <p14:creationId xmlns:p14="http://schemas.microsoft.com/office/powerpoint/2010/main" val="1064367940"/>
+        <p14:creationId xmlns:p14="http://schemas.microsoft.com/office/powerpoint/2010/main" val="3748723547"/>
       </p:ext>
     </p:extLst>
   </p:cSld>
@@ -2736,27 +2748,28 @@
           <a:p>
             <a:r>
               <a:rPr lang="en-GB" dirty="0" smtClean="0"/>
-              <a:t>To illustrate this</a:t>
+              <a:t>Here’s mine.</a:t>
+            </a:r>
+          </a:p>
+          <a:p>
+            <a:endParaRPr lang="en-GB" dirty="0" smtClean="0"/>
+          </a:p>
+          <a:p>
+            <a:r>
+              <a:rPr lang="en-GB" dirty="0" smtClean="0"/>
+              <a:t>Yes, it</a:t>
             </a:r>
             <a:r>
               <a:rPr lang="en-GB" baseline="0" dirty="0" smtClean="0"/>
-              <a:t> point, let me show you some cutlery drawers.</a:t>
-            </a:r>
-          </a:p>
-          <a:p>
+              <a:t> could probably do with a decent amount of application of the “</a:t>
+            </a:r>
+            <a:r>
+              <a:rPr lang="en-GB" baseline="0" dirty="0" err="1" smtClean="0"/>
+              <a:t>group_by</a:t>
+            </a:r>
             <a:r>
               <a:rPr lang="en-GB" baseline="0" dirty="0" smtClean="0"/>
-              <a:t>These are cutlery drawers of some folks that you might encounter at this conference and they were shared on Twitter and they sparked a debate about cutlery drawer organisation…</a:t>
-            </a:r>
-          </a:p>
-          <a:p>
-            <a:r>
-              <a:rPr lang="en-GB" baseline="0" dirty="0" smtClean="0"/>
-              <a:t>Do knives go on the left, or right, do you parse out large and small forks and spoons. </a:t>
-            </a:r>
-            <a:r>
-              <a:rPr lang="en-GB" baseline="0" dirty="0" smtClean="0"/>
-              <a:t>Do you organise by frequency of use? That kind of thing. Take a moment to consider your own cutlery drawer….</a:t>
+              <a:t>”, “gather” and “arrange” functions.</a:t>
             </a:r>
             <a:endParaRPr lang="en-GB" dirty="0"/>
           </a:p>
@@ -2765,7 +2778,7 @@
     </p:spTree>
     <p:extLst>
       <p:ext uri="{BB962C8B-B14F-4D97-AF65-F5344CB8AC3E}">
-        <p14:creationId xmlns:p14="http://schemas.microsoft.com/office/powerpoint/2010/main" val="3748723547"/>
+        <p14:creationId xmlns:p14="http://schemas.microsoft.com/office/powerpoint/2010/main" val="3495590793"/>
       </p:ext>
     </p:extLst>
   </p:cSld>
@@ -2821,28 +2834,36 @@
           <a:p>
             <a:r>
               <a:rPr lang="en-GB" dirty="0" smtClean="0"/>
-              <a:t>Here’s mine.</a:t>
-            </a:r>
-          </a:p>
-          <a:p>
-            <a:endParaRPr lang="en-GB" dirty="0" smtClean="0"/>
-          </a:p>
-          <a:p>
-            <a:r>
-              <a:rPr lang="en-GB" dirty="0" smtClean="0"/>
-              <a:t>Yes, it</a:t>
+              <a:t>Fortunately I found that XKCD</a:t>
             </a:r>
             <a:r>
               <a:rPr lang="en-GB" baseline="0" dirty="0" smtClean="0"/>
-              <a:t> could probably do with a decent amount of application of the “</a:t>
+              <a:t> has similar thoughts about home organisation…</a:t>
+            </a:r>
+          </a:p>
+          <a:p>
+            <a:endParaRPr lang="en-GB" baseline="0" dirty="0" smtClean="0"/>
+          </a:p>
+          <a:p>
+            <a:r>
+              <a:rPr lang="en-GB" baseline="0" dirty="0" smtClean="0"/>
+              <a:t>If you’ve got </a:t>
             </a:r>
             <a:r>
               <a:rPr lang="en-GB" baseline="0" dirty="0" err="1" smtClean="0"/>
-              <a:t>group_by</a:t>
+              <a:t>wifi</a:t>
             </a:r>
             <a:r>
               <a:rPr lang="en-GB" baseline="0" dirty="0" smtClean="0"/>
-              <a:t>”, “gather” and “arrange” functions.</a:t>
+              <a:t> and a laptop then basically everything else can get chucked into a big bucket labelled “</a:t>
+            </a:r>
+            <a:r>
+              <a:rPr lang="en-GB" baseline="0" dirty="0" err="1" smtClean="0"/>
+              <a:t>Misc</a:t>
+            </a:r>
+            <a:r>
+              <a:rPr lang="en-GB" baseline="0" dirty="0" smtClean="0"/>
+              <a:t>”.</a:t>
             </a:r>
             <a:endParaRPr lang="en-GB" dirty="0"/>
           </a:p>
@@ -2851,7 +2872,7 @@
     </p:spTree>
     <p:extLst>
       <p:ext uri="{BB962C8B-B14F-4D97-AF65-F5344CB8AC3E}">
-        <p14:creationId xmlns:p14="http://schemas.microsoft.com/office/powerpoint/2010/main" val="3495590793"/>
+        <p14:creationId xmlns:p14="http://schemas.microsoft.com/office/powerpoint/2010/main" val="912922685"/>
       </p:ext>
     </p:extLst>
   </p:cSld>
@@ -2907,45 +2928,24 @@
           <a:p>
             <a:r>
               <a:rPr lang="en-GB" dirty="0" smtClean="0"/>
-              <a:t>Fortunately I found that XKCD</a:t>
+              <a:t>Here’s a quote from Chris Atherton,</a:t>
             </a:r>
             <a:r>
               <a:rPr lang="en-GB" baseline="0" dirty="0" smtClean="0"/>
-              <a:t> has similar thoughts about home organisation…</a:t>
-            </a:r>
-          </a:p>
-          <a:p>
+              <a:t> who has a PhD in neuroscience and was until fairly recently an academic working in the field of cognitive load</a:t>
+            </a:r>
+            <a:r>
+              <a:rPr lang="en-GB" baseline="0" dirty="0" smtClean="0"/>
+              <a:t>.</a:t>
+            </a:r>
             <a:endParaRPr lang="en-GB" baseline="0" dirty="0" smtClean="0"/>
-          </a:p>
-          <a:p>
-            <a:r>
-              <a:rPr lang="en-GB" baseline="0" dirty="0" smtClean="0"/>
-              <a:t>If you’ve got </a:t>
-            </a:r>
-            <a:r>
-              <a:rPr lang="en-GB" baseline="0" dirty="0" err="1" smtClean="0"/>
-              <a:t>wifi</a:t>
-            </a:r>
-            <a:r>
-              <a:rPr lang="en-GB" baseline="0" dirty="0" smtClean="0"/>
-              <a:t> and a laptop then basically everything else can get chucked into a big bucket labelled “</a:t>
-            </a:r>
-            <a:r>
-              <a:rPr lang="en-GB" baseline="0" dirty="0" err="1" smtClean="0"/>
-              <a:t>Misc</a:t>
-            </a:r>
-            <a:r>
-              <a:rPr lang="en-GB" baseline="0" dirty="0" smtClean="0"/>
-              <a:t>”.</a:t>
-            </a:r>
-            <a:endParaRPr lang="en-GB" dirty="0"/>
           </a:p>
         </p:txBody>
       </p:sp>
     </p:spTree>
     <p:extLst>
       <p:ext uri="{BB962C8B-B14F-4D97-AF65-F5344CB8AC3E}">
-        <p14:creationId xmlns:p14="http://schemas.microsoft.com/office/powerpoint/2010/main" val="912922685"/>
+        <p14:creationId xmlns:p14="http://schemas.microsoft.com/office/powerpoint/2010/main" val="1064367940"/>
       </p:ext>
     </p:extLst>
   </p:cSld>
@@ -14806,14 +14806,58 @@
       </p:grpSpPr>
       <p:sp>
         <p:nvSpPr>
-          <p:cNvPr id="118" name="TextBox 3"/>
-          <p:cNvSpPr txBox="1"/>
-          <p:nvPr/>
+          <p:cNvPr id="121" name="Cutlery drawers &amp;…"/>
+          <p:cNvSpPr txBox="1">
+            <a:spLocks noGrp="1"/>
+          </p:cNvSpPr>
+          <p:nvPr>
+            <p:ph type="title" idx="4294967295"/>
+          </p:nvPr>
         </p:nvSpPr>
         <p:spPr>
           <a:xfrm>
-            <a:off x="1619671" y="1772816"/>
-            <a:ext cx="5472610" cy="3291841"/>
+            <a:off x="457200" y="92074"/>
+            <a:ext cx="8229600" cy="1508127"/>
+          </a:xfrm>
+          <a:prstGeom prst="rect">
+            <a:avLst/>
+          </a:prstGeom>
+        </p:spPr>
+        <p:txBody>
+          <a:bodyPr/>
+          <a:lstStyle/>
+          <a:p>
+            <a:r>
+              <a:t>Cutlery drawers &amp; </a:t>
+            </a:r>
+          </a:p>
+          <a:p>
+            <a:r>
+              <a:t>what they say about YOU</a:t>
+            </a:r>
+          </a:p>
+        </p:txBody>
+      </p:sp>
+      <p:pic>
+        <p:nvPicPr>
+          <p:cNvPr id="122" name="cutlery_Hadley.jpg" descr="cutlery_Hadley.jpg"/>
+          <p:cNvPicPr>
+            <a:picLocks noChangeAspect="1"/>
+          </p:cNvPicPr>
+          <p:nvPr/>
+        </p:nvPicPr>
+        <p:blipFill>
+          <a:blip r:embed="rId3">
+            <a:extLst/>
+          </a:blip>
+          <a:stretch>
+            <a:fillRect/>
+          </a:stretch>
+        </p:blipFill>
+        <p:spPr>
+          <a:xfrm>
+            <a:off x="52645" y="2008659"/>
+            <a:ext cx="2873926" cy="3831901"/>
           </a:xfrm>
           <a:prstGeom prst="rect">
             <a:avLst/>
@@ -14821,39 +14865,29 @@
           <a:ln w="12700">
             <a:miter lim="400000"/>
           </a:ln>
-          <a:extLst>
-            <a:ext uri="{C572A759-6A51-4108-AA02-DFA0A04FC94B}">
-              <ma14:wrappingTextBoxFlag xmlns="" xmlns:m="http://schemas.openxmlformats.org/officeDocument/2006/math" xmlns:a14="http://schemas.microsoft.com/office/drawing/2010/main" xmlns:ma14="http://schemas.microsoft.com/office/mac/drawingml/2011/main" val="1"/>
-            </a:ext>
-          </a:extLst>
         </p:spPr>
-        <p:txBody>
-          <a:bodyPr lIns="45719" rIns="45719">
-            <a:spAutoFit/>
-          </a:bodyPr>
-          <a:lstStyle>
-            <a:lvl1pPr>
-              <a:defRPr sz="5400"/>
-            </a:lvl1pPr>
-          </a:lstStyle>
-          <a:p>
-            <a:r>
-              <a:rPr dirty="0"/>
-              <a:t>Your (my) brain is lazy, shallow, and easily distracted.</a:t>
-            </a:r>
-          </a:p>
-        </p:txBody>
-      </p:sp>
-      <p:sp>
-        <p:nvSpPr>
-          <p:cNvPr id="119" name="TextBox 4"/>
-          <p:cNvSpPr txBox="1"/>
+      </p:pic>
+      <p:pic>
+        <p:nvPicPr>
+          <p:cNvPr id="123" name="cutlery_JimHester.jpg" descr="cutlery_JimHester.jpg"/>
+          <p:cNvPicPr>
+            <a:picLocks noChangeAspect="1"/>
+          </p:cNvPicPr>
           <p:nvPr/>
-        </p:nvSpPr>
+        </p:nvPicPr>
+        <p:blipFill>
+          <a:blip r:embed="rId4">
+            <a:extLst/>
+          </a:blip>
+          <a:srcRect l="10138" r="11634"/>
+          <a:stretch>
+            <a:fillRect/>
+          </a:stretch>
+        </p:blipFill>
         <p:spPr>
           <a:xfrm>
-            <a:off x="1619671" y="5013176"/>
-            <a:ext cx="5460788" cy="276999"/>
+            <a:off x="3032125" y="2484747"/>
+            <a:ext cx="3003693" cy="2879806"/>
           </a:xfrm>
           <a:prstGeom prst="rect">
             <a:avLst/>
@@ -14861,39 +14895,226 @@
           <a:ln w="12700">
             <a:miter lim="400000"/>
           </a:ln>
-          <a:extLst>
-            <a:ext uri="{C572A759-6A51-4108-AA02-DFA0A04FC94B}">
-              <ma14:wrappingTextBoxFlag xmlns="" xmlns:m="http://schemas.openxmlformats.org/officeDocument/2006/math" xmlns:a14="http://schemas.microsoft.com/office/drawing/2010/main" xmlns:ma14="http://schemas.microsoft.com/office/mac/drawingml/2011/main" val="1"/>
-            </a:ext>
-          </a:extLst>
         </p:spPr>
+      </p:pic>
+      <p:pic>
+        <p:nvPicPr>
+          <p:cNvPr id="124" name="cutlery_Mara.jpg" descr="cutlery_Mara.jpg"/>
+          <p:cNvPicPr>
+            <a:picLocks noChangeAspect="1"/>
+          </p:cNvPicPr>
+          <p:nvPr/>
+        </p:nvPicPr>
+        <p:blipFill>
+          <a:blip r:embed="rId5">
+            <a:extLst/>
+          </a:blip>
+          <a:stretch>
+            <a:fillRect/>
+          </a:stretch>
+        </p:blipFill>
+        <p:spPr>
+          <a:xfrm>
+            <a:off x="6128529" y="1955800"/>
+            <a:ext cx="2953216" cy="3937620"/>
+          </a:xfrm>
+          <a:prstGeom prst="rect">
+            <a:avLst/>
+          </a:prstGeom>
+          <a:ln w="12700">
+            <a:miter lim="400000"/>
+          </a:ln>
+        </p:spPr>
+      </p:pic>
+      <p:sp>
+        <p:nvSpPr>
+          <p:cNvPr id="2" name="TextBox 1"/>
+          <p:cNvSpPr txBox="1"/>
+          <p:nvPr/>
+        </p:nvSpPr>
+        <p:spPr>
+          <a:xfrm>
+            <a:off x="4067944" y="6341655"/>
+            <a:ext cx="4912561" cy="369330"/>
+          </a:xfrm>
+          <a:prstGeom prst="rect">
+            <a:avLst/>
+          </a:prstGeom>
+          <a:noFill/>
+          <a:ln w="12700" cap="flat">
+            <a:noFill/>
+            <a:miter lim="400000"/>
+          </a:ln>
+          <a:effectLst/>
+          <a:sp3d/>
+        </p:spPr>
+        <p:style>
+          <a:lnRef idx="0">
+            <a:scrgbClr r="0" g="0" b="0"/>
+          </a:lnRef>
+          <a:fillRef idx="0">
+            <a:scrgbClr r="0" g="0" b="0"/>
+          </a:fillRef>
+          <a:effectRef idx="0">
+            <a:scrgbClr r="0" g="0" b="0"/>
+          </a:effectRef>
+          <a:fontRef idx="none"/>
+        </p:style>
         <p:txBody>
-          <a:bodyPr wrap="none" lIns="45719" rIns="45719">
+          <a:bodyPr rot="0" spcFirstLastPara="1" vertOverflow="overflow" horzOverflow="overflow" vert="horz" wrap="none" lIns="45719" tIns="45719" rIns="45719" bIns="45719" numCol="1" spcCol="38100" rtlCol="0" anchor="t">
             <a:spAutoFit/>
           </a:bodyPr>
           <a:lstStyle/>
           <a:p>
-            <a:pPr>
-              <a:defRPr sz="1600"/>
+            <a:pPr marL="0" marR="0" indent="0" algn="l" defTabSz="914400" rtl="0" fontAlgn="auto" latinLnBrk="0" hangingPunct="0">
+              <a:lnSpc>
+                <a:spcPct val="100000"/>
+              </a:lnSpc>
+              <a:spcBef>
+                <a:spcPts val="0"/>
+              </a:spcBef>
+              <a:spcAft>
+                <a:spcPts val="0"/>
+              </a:spcAft>
+              <a:buClrTx/>
+              <a:buSzTx/>
+              <a:buFontTx/>
+              <a:buNone/>
+              <a:tabLst/>
             </a:pPr>
             <a:r>
-              <a:rPr sz="1200" u="sng" dirty="0">
+              <a:rPr kumimoji="0" lang="en-GB" sz="1800" b="0" i="0" u="none" strike="noStrike" cap="none" spc="0" normalizeH="0" baseline="0" dirty="0" smtClean="0">
+                <a:ln>
+                  <a:noFill/>
+                </a:ln>
                 <a:solidFill>
-                  <a:srgbClr val="0000FF"/>
+                  <a:srgbClr val="000000"/>
                 </a:solidFill>
-                <a:uFill>
-                  <a:solidFill>
-                    <a:srgbClr val="0000FF"/>
-                  </a:solidFill>
-                </a:uFill>
-                <a:hlinkClick r:id="rId3"/>
+                <a:effectLst/>
+                <a:uFillTx/>
+                <a:latin typeface="+mn-lt"/>
+                <a:ea typeface="+mn-ea"/>
+                <a:cs typeface="+mn-cs"/>
+                <a:sym typeface="Calibri"/>
               </a:rPr>
-              <a:t>https://www.slideshare.net/CJAtherton/chris-atherton-at-presentation-camp-london</a:t>
-            </a:r>
-            <a:r>
-              <a:rPr sz="1200" dirty="0"/>
-              <a:t> </a:t>
-            </a:r>
+              <a:t>HT: @</a:t>
+            </a:r>
+            <a:r>
+              <a:rPr kumimoji="0" lang="en-GB" sz="1800" b="0" i="0" u="none" strike="noStrike" cap="none" spc="0" normalizeH="0" baseline="0" dirty="0" err="1" smtClean="0">
+                <a:ln>
+                  <a:noFill/>
+                </a:ln>
+                <a:solidFill>
+                  <a:srgbClr val="000000"/>
+                </a:solidFill>
+                <a:effectLst/>
+                <a:uFillTx/>
+                <a:latin typeface="+mn-lt"/>
+                <a:ea typeface="+mn-ea"/>
+                <a:cs typeface="+mn-cs"/>
+                <a:sym typeface="Calibri"/>
+              </a:rPr>
+              <a:t>HadleyWickham</a:t>
+            </a:r>
+            <a:r>
+              <a:rPr kumimoji="0" lang="en-GB" sz="1800" b="0" i="0" u="none" strike="noStrike" cap="none" spc="0" normalizeH="0" baseline="0" dirty="0" smtClean="0">
+                <a:ln>
+                  <a:noFill/>
+                </a:ln>
+                <a:solidFill>
+                  <a:srgbClr val="000000"/>
+                </a:solidFill>
+                <a:effectLst/>
+                <a:uFillTx/>
+                <a:latin typeface="+mn-lt"/>
+                <a:ea typeface="+mn-ea"/>
+                <a:cs typeface="+mn-cs"/>
+                <a:sym typeface="Calibri"/>
+              </a:rPr>
+              <a:t>,</a:t>
+            </a:r>
+            <a:r>
+              <a:rPr kumimoji="0" lang="en-GB" sz="1800" b="0" i="0" u="none" strike="noStrike" cap="none" spc="0" normalizeH="0" dirty="0" smtClean="0">
+                <a:ln>
+                  <a:noFill/>
+                </a:ln>
+                <a:solidFill>
+                  <a:srgbClr val="000000"/>
+                </a:solidFill>
+                <a:effectLst/>
+                <a:uFillTx/>
+                <a:latin typeface="+mn-lt"/>
+                <a:ea typeface="+mn-ea"/>
+                <a:cs typeface="+mn-cs"/>
+                <a:sym typeface="Calibri"/>
+              </a:rPr>
+              <a:t> @</a:t>
+            </a:r>
+            <a:r>
+              <a:rPr kumimoji="0" lang="en-GB" sz="1800" b="0" i="0" u="none" strike="noStrike" cap="none" spc="0" normalizeH="0" dirty="0" err="1" smtClean="0">
+                <a:ln>
+                  <a:noFill/>
+                </a:ln>
+                <a:solidFill>
+                  <a:srgbClr val="000000"/>
+                </a:solidFill>
+                <a:effectLst/>
+                <a:uFillTx/>
+                <a:latin typeface="+mn-lt"/>
+                <a:ea typeface="+mn-ea"/>
+                <a:cs typeface="+mn-cs"/>
+                <a:sym typeface="Calibri"/>
+              </a:rPr>
+              <a:t>jimhester</a:t>
+            </a:r>
+            <a:r>
+              <a:rPr kumimoji="0" lang="en-GB" sz="1800" b="0" i="0" u="none" strike="noStrike" cap="none" spc="0" normalizeH="0" dirty="0" smtClean="0">
+                <a:ln>
+                  <a:noFill/>
+                </a:ln>
+                <a:solidFill>
+                  <a:srgbClr val="000000"/>
+                </a:solidFill>
+                <a:effectLst/>
+                <a:uFillTx/>
+                <a:latin typeface="+mn-lt"/>
+                <a:ea typeface="+mn-ea"/>
+                <a:cs typeface="+mn-cs"/>
+                <a:sym typeface="Calibri"/>
+              </a:rPr>
+              <a:t>_, @</a:t>
+            </a:r>
+            <a:r>
+              <a:rPr kumimoji="0" lang="en-GB" sz="1800" b="0" i="0" u="none" strike="noStrike" cap="none" spc="0" normalizeH="0" dirty="0" err="1" smtClean="0">
+                <a:ln>
+                  <a:noFill/>
+                </a:ln>
+                <a:solidFill>
+                  <a:srgbClr val="000000"/>
+                </a:solidFill>
+                <a:effectLst/>
+                <a:uFillTx/>
+                <a:latin typeface="+mn-lt"/>
+                <a:ea typeface="+mn-ea"/>
+                <a:cs typeface="+mn-cs"/>
+                <a:sym typeface="Calibri"/>
+              </a:rPr>
+              <a:t>dataandme</a:t>
+            </a:r>
+            <a:endParaRPr kumimoji="0" lang="en-GB" sz="1800" b="0" i="0" u="none" strike="noStrike" cap="none" spc="0" normalizeH="0" baseline="0" dirty="0">
+              <a:ln>
+                <a:noFill/>
+              </a:ln>
+              <a:solidFill>
+                <a:srgbClr val="000000"/>
+              </a:solidFill>
+              <a:effectLst/>
+              <a:uFillTx/>
+              <a:latin typeface="+mn-lt"/>
+              <a:ea typeface="+mn-ea"/>
+              <a:cs typeface="+mn-cs"/>
+              <a:sym typeface="Calibri"/>
+            </a:endParaRPr>
           </a:p>
         </p:txBody>
       </p:sp>
@@ -15454,353 +15675,6 @@
       </p:grpSpPr>
       <p:sp>
         <p:nvSpPr>
-          <p:cNvPr id="121" name="Cutlery drawers &amp;…"/>
-          <p:cNvSpPr txBox="1">
-            <a:spLocks noGrp="1"/>
-          </p:cNvSpPr>
-          <p:nvPr>
-            <p:ph type="title" idx="4294967295"/>
-          </p:nvPr>
-        </p:nvSpPr>
-        <p:spPr>
-          <a:xfrm>
-            <a:off x="457200" y="92074"/>
-            <a:ext cx="8229600" cy="1508127"/>
-          </a:xfrm>
-          <a:prstGeom prst="rect">
-            <a:avLst/>
-          </a:prstGeom>
-        </p:spPr>
-        <p:txBody>
-          <a:bodyPr/>
-          <a:lstStyle/>
-          <a:p>
-            <a:r>
-              <a:t>Cutlery drawers &amp; </a:t>
-            </a:r>
-          </a:p>
-          <a:p>
-            <a:r>
-              <a:t>what they say about YOU</a:t>
-            </a:r>
-          </a:p>
-        </p:txBody>
-      </p:sp>
-      <p:pic>
-        <p:nvPicPr>
-          <p:cNvPr id="122" name="cutlery_Hadley.jpg" descr="cutlery_Hadley.jpg"/>
-          <p:cNvPicPr>
-            <a:picLocks noChangeAspect="1"/>
-          </p:cNvPicPr>
-          <p:nvPr/>
-        </p:nvPicPr>
-        <p:blipFill>
-          <a:blip r:embed="rId3">
-            <a:extLst/>
-          </a:blip>
-          <a:stretch>
-            <a:fillRect/>
-          </a:stretch>
-        </p:blipFill>
-        <p:spPr>
-          <a:xfrm>
-            <a:off x="52645" y="2008659"/>
-            <a:ext cx="2873926" cy="3831901"/>
-          </a:xfrm>
-          <a:prstGeom prst="rect">
-            <a:avLst/>
-          </a:prstGeom>
-          <a:ln w="12700">
-            <a:miter lim="400000"/>
-          </a:ln>
-        </p:spPr>
-      </p:pic>
-      <p:pic>
-        <p:nvPicPr>
-          <p:cNvPr id="123" name="cutlery_JimHester.jpg" descr="cutlery_JimHester.jpg"/>
-          <p:cNvPicPr>
-            <a:picLocks noChangeAspect="1"/>
-          </p:cNvPicPr>
-          <p:nvPr/>
-        </p:nvPicPr>
-        <p:blipFill>
-          <a:blip r:embed="rId4">
-            <a:extLst/>
-          </a:blip>
-          <a:srcRect l="10138" r="11634"/>
-          <a:stretch>
-            <a:fillRect/>
-          </a:stretch>
-        </p:blipFill>
-        <p:spPr>
-          <a:xfrm>
-            <a:off x="3032125" y="2484747"/>
-            <a:ext cx="3003693" cy="2879806"/>
-          </a:xfrm>
-          <a:prstGeom prst="rect">
-            <a:avLst/>
-          </a:prstGeom>
-          <a:ln w="12700">
-            <a:miter lim="400000"/>
-          </a:ln>
-        </p:spPr>
-      </p:pic>
-      <p:pic>
-        <p:nvPicPr>
-          <p:cNvPr id="124" name="cutlery_Mara.jpg" descr="cutlery_Mara.jpg"/>
-          <p:cNvPicPr>
-            <a:picLocks noChangeAspect="1"/>
-          </p:cNvPicPr>
-          <p:nvPr/>
-        </p:nvPicPr>
-        <p:blipFill>
-          <a:blip r:embed="rId5">
-            <a:extLst/>
-          </a:blip>
-          <a:stretch>
-            <a:fillRect/>
-          </a:stretch>
-        </p:blipFill>
-        <p:spPr>
-          <a:xfrm>
-            <a:off x="6128529" y="1955800"/>
-            <a:ext cx="2953216" cy="3937620"/>
-          </a:xfrm>
-          <a:prstGeom prst="rect">
-            <a:avLst/>
-          </a:prstGeom>
-          <a:ln w="12700">
-            <a:miter lim="400000"/>
-          </a:ln>
-        </p:spPr>
-      </p:pic>
-      <p:sp>
-        <p:nvSpPr>
-          <p:cNvPr id="2" name="TextBox 1"/>
-          <p:cNvSpPr txBox="1"/>
-          <p:nvPr/>
-        </p:nvSpPr>
-        <p:spPr>
-          <a:xfrm>
-            <a:off x="4067944" y="6341655"/>
-            <a:ext cx="4912561" cy="369330"/>
-          </a:xfrm>
-          <a:prstGeom prst="rect">
-            <a:avLst/>
-          </a:prstGeom>
-          <a:noFill/>
-          <a:ln w="12700" cap="flat">
-            <a:noFill/>
-            <a:miter lim="400000"/>
-          </a:ln>
-          <a:effectLst/>
-          <a:sp3d/>
-        </p:spPr>
-        <p:style>
-          <a:lnRef idx="0">
-            <a:scrgbClr r="0" g="0" b="0"/>
-          </a:lnRef>
-          <a:fillRef idx="0">
-            <a:scrgbClr r="0" g="0" b="0"/>
-          </a:fillRef>
-          <a:effectRef idx="0">
-            <a:scrgbClr r="0" g="0" b="0"/>
-          </a:effectRef>
-          <a:fontRef idx="none"/>
-        </p:style>
-        <p:txBody>
-          <a:bodyPr rot="0" spcFirstLastPara="1" vertOverflow="overflow" horzOverflow="overflow" vert="horz" wrap="none" lIns="45719" tIns="45719" rIns="45719" bIns="45719" numCol="1" spcCol="38100" rtlCol="0" anchor="t">
-            <a:spAutoFit/>
-          </a:bodyPr>
-          <a:lstStyle/>
-          <a:p>
-            <a:pPr marL="0" marR="0" indent="0" algn="l" defTabSz="914400" rtl="0" fontAlgn="auto" latinLnBrk="0" hangingPunct="0">
-              <a:lnSpc>
-                <a:spcPct val="100000"/>
-              </a:lnSpc>
-              <a:spcBef>
-                <a:spcPts val="0"/>
-              </a:spcBef>
-              <a:spcAft>
-                <a:spcPts val="0"/>
-              </a:spcAft>
-              <a:buClrTx/>
-              <a:buSzTx/>
-              <a:buFontTx/>
-              <a:buNone/>
-              <a:tabLst/>
-            </a:pPr>
-            <a:r>
-              <a:rPr kumimoji="0" lang="en-GB" sz="1800" b="0" i="0" u="none" strike="noStrike" cap="none" spc="0" normalizeH="0" baseline="0" dirty="0" smtClean="0">
-                <a:ln>
-                  <a:noFill/>
-                </a:ln>
-                <a:solidFill>
-                  <a:srgbClr val="000000"/>
-                </a:solidFill>
-                <a:effectLst/>
-                <a:uFillTx/>
-                <a:latin typeface="+mn-lt"/>
-                <a:ea typeface="+mn-ea"/>
-                <a:cs typeface="+mn-cs"/>
-                <a:sym typeface="Calibri"/>
-              </a:rPr>
-              <a:t>HT: @</a:t>
-            </a:r>
-            <a:r>
-              <a:rPr kumimoji="0" lang="en-GB" sz="1800" b="0" i="0" u="none" strike="noStrike" cap="none" spc="0" normalizeH="0" baseline="0" dirty="0" err="1" smtClean="0">
-                <a:ln>
-                  <a:noFill/>
-                </a:ln>
-                <a:solidFill>
-                  <a:srgbClr val="000000"/>
-                </a:solidFill>
-                <a:effectLst/>
-                <a:uFillTx/>
-                <a:latin typeface="+mn-lt"/>
-                <a:ea typeface="+mn-ea"/>
-                <a:cs typeface="+mn-cs"/>
-                <a:sym typeface="Calibri"/>
-              </a:rPr>
-              <a:t>HadleyWickham</a:t>
-            </a:r>
-            <a:r>
-              <a:rPr kumimoji="0" lang="en-GB" sz="1800" b="0" i="0" u="none" strike="noStrike" cap="none" spc="0" normalizeH="0" baseline="0" dirty="0" smtClean="0">
-                <a:ln>
-                  <a:noFill/>
-                </a:ln>
-                <a:solidFill>
-                  <a:srgbClr val="000000"/>
-                </a:solidFill>
-                <a:effectLst/>
-                <a:uFillTx/>
-                <a:latin typeface="+mn-lt"/>
-                <a:ea typeface="+mn-ea"/>
-                <a:cs typeface="+mn-cs"/>
-                <a:sym typeface="Calibri"/>
-              </a:rPr>
-              <a:t>,</a:t>
-            </a:r>
-            <a:r>
-              <a:rPr kumimoji="0" lang="en-GB" sz="1800" b="0" i="0" u="none" strike="noStrike" cap="none" spc="0" normalizeH="0" dirty="0" smtClean="0">
-                <a:ln>
-                  <a:noFill/>
-                </a:ln>
-                <a:solidFill>
-                  <a:srgbClr val="000000"/>
-                </a:solidFill>
-                <a:effectLst/>
-                <a:uFillTx/>
-                <a:latin typeface="+mn-lt"/>
-                <a:ea typeface="+mn-ea"/>
-                <a:cs typeface="+mn-cs"/>
-                <a:sym typeface="Calibri"/>
-              </a:rPr>
-              <a:t> @</a:t>
-            </a:r>
-            <a:r>
-              <a:rPr kumimoji="0" lang="en-GB" sz="1800" b="0" i="0" u="none" strike="noStrike" cap="none" spc="0" normalizeH="0" dirty="0" err="1" smtClean="0">
-                <a:ln>
-                  <a:noFill/>
-                </a:ln>
-                <a:solidFill>
-                  <a:srgbClr val="000000"/>
-                </a:solidFill>
-                <a:effectLst/>
-                <a:uFillTx/>
-                <a:latin typeface="+mn-lt"/>
-                <a:ea typeface="+mn-ea"/>
-                <a:cs typeface="+mn-cs"/>
-                <a:sym typeface="Calibri"/>
-              </a:rPr>
-              <a:t>jimhester</a:t>
-            </a:r>
-            <a:r>
-              <a:rPr kumimoji="0" lang="en-GB" sz="1800" b="0" i="0" u="none" strike="noStrike" cap="none" spc="0" normalizeH="0" dirty="0" smtClean="0">
-                <a:ln>
-                  <a:noFill/>
-                </a:ln>
-                <a:solidFill>
-                  <a:srgbClr val="000000"/>
-                </a:solidFill>
-                <a:effectLst/>
-                <a:uFillTx/>
-                <a:latin typeface="+mn-lt"/>
-                <a:ea typeface="+mn-ea"/>
-                <a:cs typeface="+mn-cs"/>
-                <a:sym typeface="Calibri"/>
-              </a:rPr>
-              <a:t>_, @</a:t>
-            </a:r>
-            <a:r>
-              <a:rPr kumimoji="0" lang="en-GB" sz="1800" b="0" i="0" u="none" strike="noStrike" cap="none" spc="0" normalizeH="0" dirty="0" err="1" smtClean="0">
-                <a:ln>
-                  <a:noFill/>
-                </a:ln>
-                <a:solidFill>
-                  <a:srgbClr val="000000"/>
-                </a:solidFill>
-                <a:effectLst/>
-                <a:uFillTx/>
-                <a:latin typeface="+mn-lt"/>
-                <a:ea typeface="+mn-ea"/>
-                <a:cs typeface="+mn-cs"/>
-                <a:sym typeface="Calibri"/>
-              </a:rPr>
-              <a:t>dataandme</a:t>
-            </a:r>
-            <a:endParaRPr kumimoji="0" lang="en-GB" sz="1800" b="0" i="0" u="none" strike="noStrike" cap="none" spc="0" normalizeH="0" baseline="0" dirty="0">
-              <a:ln>
-                <a:noFill/>
-              </a:ln>
-              <a:solidFill>
-                <a:srgbClr val="000000"/>
-              </a:solidFill>
-              <a:effectLst/>
-              <a:uFillTx/>
-              <a:latin typeface="+mn-lt"/>
-              <a:ea typeface="+mn-ea"/>
-              <a:cs typeface="+mn-cs"/>
-              <a:sym typeface="Calibri"/>
-            </a:endParaRPr>
-          </a:p>
-        </p:txBody>
-      </p:sp>
-    </p:spTree>
-  </p:cSld>
-  <p:clrMapOvr>
-    <a:masterClrMapping/>
-  </p:clrMapOvr>
-  <p:transition spd="med"/>
-  <p:timing>
-    <p:tnLst>
-      <p:par>
-        <p:cTn id="1" dur="indefinite" restart="never" nodeType="tmRoot"/>
-      </p:par>
-    </p:tnLst>
-  </p:timing>
-</p:sld>
-</file>
-
-<file path=ppt/slides/slide5.xml><?xml version="1.0" encoding="utf-8"?>
-<p:sld xmlns:a="http://schemas.openxmlformats.org/drawingml/2006/main" xmlns:r="http://schemas.openxmlformats.org/officeDocument/2006/relationships" xmlns:p="http://schemas.openxmlformats.org/presentationml/2006/main">
-  <p:cSld>
-    <p:spTree>
-      <p:nvGrpSpPr>
-        <p:cNvPr id="1" name=""/>
-        <p:cNvGrpSpPr/>
-        <p:nvPr/>
-      </p:nvGrpSpPr>
-      <p:grpSpPr>
-        <a:xfrm>
-          <a:off x="0" y="0"/>
-          <a:ext cx="0" cy="0"/>
-          <a:chOff x="0" y="0"/>
-          <a:chExt cx="0" cy="0"/>
-        </a:xfrm>
-      </p:grpSpPr>
-      <p:sp>
-        <p:nvSpPr>
           <p:cNvPr id="126" name="Mine… (sorry, not sorry)"/>
           <p:cNvSpPr txBox="1">
             <a:spLocks noGrp="1"/>
@@ -16364,7 +16238,7 @@
 </p:sld>
 </file>
 
-<file path=ppt/slides/slide6.xml><?xml version="1.0" encoding="utf-8"?>
+<file path=ppt/slides/slide5.xml><?xml version="1.0" encoding="utf-8"?>
 <p:sld xmlns:a="http://schemas.openxmlformats.org/drawingml/2006/main" xmlns:r="http://schemas.openxmlformats.org/officeDocument/2006/relationships" xmlns:p="http://schemas.openxmlformats.org/presentationml/2006/main">
   <p:cSld>
     <p:spTree>
@@ -16484,6 +16358,137 @@
         </p:txBody>
       </p:sp>
     </p:spTree>
+  </p:cSld>
+  <p:clrMapOvr>
+    <a:masterClrMapping/>
+  </p:clrMapOvr>
+  <p:transition spd="med"/>
+  <p:timing>
+    <p:tnLst>
+      <p:par>
+        <p:cTn id="1" dur="indefinite" restart="never" nodeType="tmRoot"/>
+      </p:par>
+    </p:tnLst>
+  </p:timing>
+</p:sld>
+</file>
+
+<file path=ppt/slides/slide6.xml><?xml version="1.0" encoding="utf-8"?>
+<p:sld xmlns:a="http://schemas.openxmlformats.org/drawingml/2006/main" xmlns:r="http://schemas.openxmlformats.org/officeDocument/2006/relationships" xmlns:p="http://schemas.openxmlformats.org/presentationml/2006/main">
+  <p:cSld>
+    <p:spTree>
+      <p:nvGrpSpPr>
+        <p:cNvPr id="1" name=""/>
+        <p:cNvGrpSpPr/>
+        <p:nvPr/>
+      </p:nvGrpSpPr>
+      <p:grpSpPr>
+        <a:xfrm>
+          <a:off x="0" y="0"/>
+          <a:ext cx="0" cy="0"/>
+          <a:chOff x="0" y="0"/>
+          <a:chExt cx="0" cy="0"/>
+        </a:xfrm>
+      </p:grpSpPr>
+      <p:sp>
+        <p:nvSpPr>
+          <p:cNvPr id="118" name="TextBox 3"/>
+          <p:cNvSpPr txBox="1"/>
+          <p:nvPr/>
+        </p:nvSpPr>
+        <p:spPr>
+          <a:xfrm>
+            <a:off x="1619671" y="1772816"/>
+            <a:ext cx="5472610" cy="3291841"/>
+          </a:xfrm>
+          <a:prstGeom prst="rect">
+            <a:avLst/>
+          </a:prstGeom>
+          <a:ln w="12700">
+            <a:miter lim="400000"/>
+          </a:ln>
+          <a:extLst>
+            <a:ext uri="{C572A759-6A51-4108-AA02-DFA0A04FC94B}">
+              <ma14:wrappingTextBoxFlag xmlns="" xmlns:m="http://schemas.openxmlformats.org/officeDocument/2006/math" xmlns:a14="http://schemas.microsoft.com/office/drawing/2010/main" xmlns:ma14="http://schemas.microsoft.com/office/mac/drawingml/2011/main" val="1"/>
+            </a:ext>
+          </a:extLst>
+        </p:spPr>
+        <p:txBody>
+          <a:bodyPr lIns="45719" rIns="45719">
+            <a:spAutoFit/>
+          </a:bodyPr>
+          <a:lstStyle>
+            <a:lvl1pPr>
+              <a:defRPr sz="5400"/>
+            </a:lvl1pPr>
+          </a:lstStyle>
+          <a:p>
+            <a:r>
+              <a:rPr dirty="0"/>
+              <a:t>Your (my) brain is lazy, shallow, and easily distracted.</a:t>
+            </a:r>
+          </a:p>
+        </p:txBody>
+      </p:sp>
+      <p:sp>
+        <p:nvSpPr>
+          <p:cNvPr id="119" name="TextBox 4"/>
+          <p:cNvSpPr txBox="1"/>
+          <p:nvPr/>
+        </p:nvSpPr>
+        <p:spPr>
+          <a:xfrm>
+            <a:off x="1619671" y="5013176"/>
+            <a:ext cx="5460788" cy="276999"/>
+          </a:xfrm>
+          <a:prstGeom prst="rect">
+            <a:avLst/>
+          </a:prstGeom>
+          <a:ln w="12700">
+            <a:miter lim="400000"/>
+          </a:ln>
+          <a:extLst>
+            <a:ext uri="{C572A759-6A51-4108-AA02-DFA0A04FC94B}">
+              <ma14:wrappingTextBoxFlag xmlns="" xmlns:m="http://schemas.openxmlformats.org/officeDocument/2006/math" xmlns:a14="http://schemas.microsoft.com/office/drawing/2010/main" xmlns:ma14="http://schemas.microsoft.com/office/mac/drawingml/2011/main" val="1"/>
+            </a:ext>
+          </a:extLst>
+        </p:spPr>
+        <p:txBody>
+          <a:bodyPr wrap="none" lIns="45719" rIns="45719">
+            <a:spAutoFit/>
+          </a:bodyPr>
+          <a:lstStyle/>
+          <a:p>
+            <a:pPr>
+              <a:defRPr sz="1600"/>
+            </a:pPr>
+            <a:r>
+              <a:rPr sz="1200" u="sng" dirty="0">
+                <a:solidFill>
+                  <a:srgbClr val="0000FF"/>
+                </a:solidFill>
+                <a:uFill>
+                  <a:solidFill>
+                    <a:srgbClr val="0000FF"/>
+                  </a:solidFill>
+                </a:uFill>
+                <a:hlinkClick r:id="rId3"/>
+              </a:rPr>
+              <a:t>https://www.slideshare.net/CJAtherton/chris-atherton-at-presentation-camp-london</a:t>
+            </a:r>
+            <a:r>
+              <a:rPr sz="1200" dirty="0"/>
+              <a:t> </a:t>
+            </a:r>
+          </a:p>
+        </p:txBody>
+      </p:sp>
+    </p:spTree>
+    <p:extLst>
+      <p:ext uri="{BB962C8B-B14F-4D97-AF65-F5344CB8AC3E}">
+        <p14:creationId xmlns:p14="http://schemas.microsoft.com/office/powerpoint/2010/main" val="2071862162"/>
+      </p:ext>
+    </p:extLst>
   </p:cSld>
   <p:clrMapOvr>
     <a:masterClrMapping/>

</xml_diff>

<commit_message>
Update speaker notes to follow what was actually delivered, and added alt-text to images in Powerpoint.
</commit_message>
<xml_diff>
--- a/The lazy and easily distracted report writer.pptx
+++ b/The lazy and easily distracted report writer.pptx
@@ -874,39 +874,61 @@
           <a:p>
             <a:r>
               <a:rPr lang="en-GB" dirty="0" smtClean="0"/>
-              <a:t>I then have a discussion with my boss to brief him on what I’m</a:t>
-            </a:r>
-            <a:r>
-              <a:rPr lang="en-GB" baseline="0" dirty="0" smtClean="0"/>
-              <a:t> seeing and if all is well then I circulate the report…</a:t>
-            </a:r>
-          </a:p>
-          <a:p>
-            <a:endParaRPr lang="en-GB" baseline="0" dirty="0" smtClean="0"/>
-          </a:p>
-          <a:p>
-            <a:r>
-              <a:rPr lang="en-GB" baseline="0" dirty="0" smtClean="0"/>
+              <a:t>I then have a discussion with my boss to brief him on what I’m seeing and if all is well then I circulate the report…</a:t>
+            </a:r>
+          </a:p>
+          <a:p>
+            <a:r>
+              <a:rPr lang="en-GB" dirty="0" smtClean="0"/>
               <a:t>And we’re DONE.</a:t>
             </a:r>
           </a:p>
           <a:p>
-            <a:endParaRPr lang="en-GB" baseline="0" dirty="0" smtClean="0"/>
-          </a:p>
-          <a:p>
-            <a:r>
-              <a:rPr lang="en-GB" baseline="0" dirty="0" smtClean="0"/>
-              <a:t>Hang on. Sorry. Were you distracted by the text in light grey? Yes? Ah, so it’s NOT just me then</a:t>
-            </a:r>
-            <a:r>
-              <a:rPr lang="en-GB" baseline="0" dirty="0" smtClean="0"/>
-              <a:t>.</a:t>
-            </a:r>
-          </a:p>
-          <a:p>
-            <a:r>
-              <a:rPr lang="en-GB" baseline="0" dirty="0" smtClean="0"/>
-              <a:t>And how many folks noticed that the “Visualise” and “Transform” elements of the Data Science diagram were swapped?</a:t>
+            <a:endParaRPr lang="en-GB" dirty="0" smtClean="0"/>
+          </a:p>
+          <a:p>
+            <a:r>
+              <a:rPr lang="en-GB" dirty="0" smtClean="0"/>
+              <a:t>Hang on. </a:t>
+            </a:r>
+          </a:p>
+          <a:p>
+            <a:r>
+              <a:rPr lang="en-GB" dirty="0" smtClean="0"/>
+              <a:t>Sorry. </a:t>
+            </a:r>
+          </a:p>
+          <a:p>
+            <a:r>
+              <a:rPr lang="en-GB" dirty="0" smtClean="0"/>
+              <a:t>Were you distracted by the text in light grey? </a:t>
+            </a:r>
+          </a:p>
+          <a:p>
+            <a:r>
+              <a:rPr lang="en-GB" dirty="0" smtClean="0"/>
+              <a:t>Yes? </a:t>
+            </a:r>
+          </a:p>
+          <a:p>
+            <a:r>
+              <a:rPr lang="en-GB" dirty="0" smtClean="0"/>
+              <a:t>Ah, so it’s NOT just me that gets distracted then...</a:t>
+            </a:r>
+          </a:p>
+          <a:p>
+            <a:endParaRPr lang="en-GB" dirty="0" smtClean="0"/>
+          </a:p>
+          <a:p>
+            <a:r>
+              <a:rPr lang="en-GB" dirty="0" smtClean="0"/>
+              <a:t>And did anyone notice that the "Visualise" and "Transform" items in the R For Data Science diagram were back to front? </a:t>
+            </a:r>
+          </a:p>
+          <a:p>
+            <a:r>
+              <a:rPr lang="en-GB" dirty="0" smtClean="0"/>
+              <a:t>Score 1 to Cognitive Load Theory.</a:t>
             </a:r>
             <a:endParaRPr lang="en-GB" dirty="0"/>
           </a:p>
@@ -971,51 +993,8 @@
           <a:p>
             <a:r>
               <a:rPr lang="en-GB" dirty="0" smtClean="0"/>
-              <a:t>At this point I really should have a video clip of some tumbleweed,</a:t>
-            </a:r>
-            <a:r>
-              <a:rPr lang="en-GB" baseline="0" dirty="0" smtClean="0"/>
-              <a:t> because the project team I did this work for suddenly had competing priorities and my work was put on the back burner.</a:t>
-            </a:r>
-          </a:p>
-          <a:p>
-            <a:r>
-              <a:rPr lang="en-GB" baseline="0" dirty="0" smtClean="0"/>
-              <a:t>Like the REALLY back burner.</a:t>
-            </a:r>
-          </a:p>
-          <a:p>
-            <a:r>
-              <a:rPr lang="en-GB" baseline="0" dirty="0" smtClean="0"/>
-              <a:t>So back it’s probably in a different house. In a different country. In a locked room. </a:t>
-            </a:r>
-            <a:r>
-              <a:rPr lang="en-GB" baseline="0" dirty="0" smtClean="0"/>
-              <a:t>With a </a:t>
-            </a:r>
-            <a:r>
-              <a:rPr lang="en-GB" baseline="0" dirty="0" smtClean="0"/>
-              <a:t>“Beware of the leopard” sign on the door.</a:t>
-            </a:r>
-          </a:p>
-          <a:p>
-            <a:endParaRPr lang="en-GB" baseline="0" dirty="0" smtClean="0"/>
-          </a:p>
-          <a:p>
-            <a:r>
-              <a:rPr lang="en-GB" baseline="0" dirty="0" smtClean="0"/>
-              <a:t>And at this point </a:t>
-            </a:r>
-            <a:r>
-              <a:rPr lang="en-GB" baseline="0" dirty="0" smtClean="0"/>
-              <a:t>when they </a:t>
-            </a:r>
-            <a:r>
-              <a:rPr lang="en-GB" baseline="0" dirty="0" smtClean="0"/>
-              <a:t>come back to me to ask about my analysis, I’m going to REALLY struggle to bring back to mind what I did 6 months ago.</a:t>
-            </a:r>
-          </a:p>
-          <a:p>
+              <a:t>No word of a lie, I got an email YESTERDAY from my boss about this analysis and asking me to get back in touch with the project team to discuss it with them. And if you've just written a script which is NOT reproducible then at this point you're going to be in a world of hurt... Because you'll pop open the script and wonder what the HECK you were thinking 6 months ago.</a:t>
+            </a:r>
             <a:endParaRPr lang="en-GB" dirty="0"/>
           </a:p>
         </p:txBody>
@@ -1087,7 +1066,33 @@
             </a:r>
             <a:r>
               <a:rPr lang="en-GB" dirty="0" smtClean="0"/>
-              <a:t> and notebooks.</a:t>
+              <a:t> and notebooks</a:t>
+            </a:r>
+            <a:r>
+              <a:rPr lang="en-GB" dirty="0" smtClean="0"/>
+              <a:t>.</a:t>
+            </a:r>
+          </a:p>
+          <a:p>
+            <a:r>
+              <a:rPr lang="en-GB" dirty="0" smtClean="0"/>
+              <a:t>Thanks to </a:t>
+            </a:r>
+            <a:r>
+              <a:rPr lang="en-GB" dirty="0" err="1" smtClean="0"/>
+              <a:t>Yihui</a:t>
+            </a:r>
+            <a:r>
+              <a:rPr lang="en-GB" dirty="0" smtClean="0"/>
+              <a:t> and team at </a:t>
+            </a:r>
+            <a:r>
+              <a:rPr lang="en-GB" dirty="0" err="1" smtClean="0"/>
+              <a:t>RStudio</a:t>
+            </a:r>
+            <a:r>
+              <a:rPr lang="en-GB" dirty="0" smtClean="0"/>
+              <a:t> who are working on these things.</a:t>
             </a:r>
             <a:endParaRPr lang="en-GB" dirty="0"/>
           </a:p>
@@ -1301,11 +1306,7 @@
             </a:r>
             <a:r>
               <a:rPr lang="en-GB" baseline="0" dirty="0" smtClean="0"/>
-              <a:t> for capturing </a:t>
-            </a:r>
-            <a:r>
-              <a:rPr lang="en-GB" baseline="0" dirty="0" smtClean="0"/>
-              <a:t>ANALYSIS not for functions or scripts in other circumstances. For more details see </a:t>
+              <a:t> for capturing ANALYSIS not for functions or scripts in other circumstances. For more details see </a:t>
             </a:r>
             <a:r>
               <a:rPr lang="en-GB" baseline="0" dirty="0" err="1" smtClean="0"/>
@@ -1344,8 +1345,30 @@
             </a:r>
             <a:r>
               <a:rPr lang="en-GB" baseline="0" dirty="0" smtClean="0"/>
-              <a:t> and notebooks.</a:t>
-            </a:r>
+              <a:t> and notebooks</a:t>
+            </a:r>
+            <a:r>
+              <a:rPr lang="en-GB" baseline="0" dirty="0" smtClean="0"/>
+              <a:t>.</a:t>
+            </a:r>
+          </a:p>
+          <a:p>
+            <a:endParaRPr lang="en-GB" baseline="0" dirty="0" smtClean="0"/>
+          </a:p>
+          <a:p>
+            <a:r>
+              <a:rPr lang="en-GB" baseline="0" dirty="0" smtClean="0"/>
+              <a:t>But if you're NOT writing for analysis then I encourage you to read the blog post from </a:t>
+            </a:r>
+            <a:r>
+              <a:rPr lang="en-GB" baseline="0" dirty="0" err="1" smtClean="0"/>
+              <a:t>Yihui</a:t>
+            </a:r>
+            <a:r>
+              <a:rPr lang="en-GB" baseline="0" dirty="0" smtClean="0"/>
+              <a:t> in the link.</a:t>
+            </a:r>
+            <a:endParaRPr lang="en-GB" baseline="0" dirty="0" smtClean="0"/>
           </a:p>
         </p:txBody>
       </p:sp>
@@ -2427,6 +2450,40 @@
           <a:p>
             <a:r>
               <a:rPr lang="en-GB" baseline="0" dirty="0" smtClean="0"/>
+              <a:t>While I've shown you how to render with parameters via the GUI and in </a:t>
+            </a:r>
+            <a:r>
+              <a:rPr lang="en-GB" baseline="0" dirty="0" err="1" smtClean="0"/>
+              <a:t>RStudio</a:t>
+            </a:r>
+            <a:r>
+              <a:rPr lang="en-GB" baseline="0" dirty="0" smtClean="0"/>
+              <a:t> Connect, you CAN also pass parameters as a list in the </a:t>
+            </a:r>
+            <a:r>
+              <a:rPr lang="en-GB" baseline="0" dirty="0" err="1" smtClean="0"/>
+              <a:t>rmarkdown</a:t>
+            </a:r>
+            <a:r>
+              <a:rPr lang="en-GB" baseline="0" dirty="0" smtClean="0"/>
+              <a:t>::render function.</a:t>
+            </a:r>
+          </a:p>
+          <a:p>
+            <a:endParaRPr lang="en-GB" baseline="0" dirty="0" smtClean="0"/>
+          </a:p>
+          <a:p>
+            <a:r>
+              <a:rPr lang="en-GB" baseline="0" dirty="0" smtClean="0"/>
+              <a:t>Of course, as XKCD points out, if you automate to this level you have to be a bit careful.</a:t>
+            </a:r>
+          </a:p>
+          <a:p>
+            <a:endParaRPr lang="en-GB" baseline="0" dirty="0" smtClean="0"/>
+          </a:p>
+          <a:p>
+            <a:r>
+              <a:rPr lang="en-GB" baseline="0" dirty="0" smtClean="0"/>
               <a:t>So </a:t>
             </a:r>
             <a:r>
@@ -2510,27 +2567,15 @@
           <a:p>
             <a:r>
               <a:rPr lang="en-GB" dirty="0" smtClean="0"/>
-              <a:t>To illustrate this</a:t>
-            </a:r>
-            <a:r>
-              <a:rPr lang="en-GB" baseline="0" dirty="0" smtClean="0"/>
-              <a:t> point, let me show you some cutlery drawers.</a:t>
-            </a:r>
-          </a:p>
-          <a:p>
-            <a:r>
-              <a:rPr lang="en-GB" baseline="0" dirty="0" smtClean="0"/>
-              <a:t>These are cutlery drawers of some folks that you might encounter at this conference and they were shared on Twitter and they sparked a debate about cutlery drawer organisation…</a:t>
-            </a:r>
-          </a:p>
-          <a:p>
-            <a:r>
-              <a:rPr lang="en-GB" baseline="0" dirty="0" smtClean="0"/>
-              <a:t>Do knives go on the left, or right, do you parse out large and small forks and spoons. </a:t>
-            </a:r>
-            <a:r>
-              <a:rPr lang="en-GB" baseline="0" dirty="0" smtClean="0"/>
-              <a:t>Do you organise by frequency of use? That kind of thing. Take a moment to consider your own cutlery drawer….</a:t>
+              <a:t>But what I REALLY want to talk to you about today is cutlery </a:t>
+            </a:r>
+            <a:r>
+              <a:rPr lang="en-GB" dirty="0" err="1" smtClean="0"/>
+              <a:t>drawers.These</a:t>
+            </a:r>
+            <a:r>
+              <a:rPr lang="en-GB" dirty="0" smtClean="0"/>
+              <a:t> are cutlery drawers of some folks that you might encounter at this conference and they were shared on Twitter and they sparked a debate about cutlery drawer organisation…Do knives go on the left, or right, do you parse out large and small forks and spoons, do you organise by "most used"...</a:t>
             </a:r>
             <a:endParaRPr lang="en-GB" dirty="0"/>
           </a:p>
@@ -2595,25 +2640,30 @@
           <a:p>
             <a:r>
               <a:rPr lang="en-GB" dirty="0" smtClean="0"/>
-              <a:t>And</a:t>
-            </a:r>
-            <a:r>
-              <a:rPr lang="en-GB" baseline="0" dirty="0" smtClean="0"/>
-              <a:t> you should also bear in mind that the amount of time you take to implement all of this may not provide a good return on investment.</a:t>
-            </a:r>
-          </a:p>
-          <a:p>
-            <a:r>
-              <a:rPr lang="en-GB" baseline="0" dirty="0" smtClean="0"/>
-              <a:t>Even over five years.</a:t>
-            </a:r>
-          </a:p>
-          <a:p>
-            <a:endParaRPr lang="en-GB" baseline="0" dirty="0" smtClean="0"/>
-          </a:p>
-          <a:p>
-            <a:r>
-              <a:rPr lang="en-GB" baseline="0" dirty="0" smtClean="0"/>
+              <a:t>I know that JD Long is also talking about this graphic, and I encourage you to seek out that presentation afterwards to hear what he has to say on the matter... </a:t>
+            </a:r>
+          </a:p>
+          <a:p>
+            <a:endParaRPr lang="en-GB" dirty="0" smtClean="0"/>
+          </a:p>
+          <a:p>
+            <a:r>
+              <a:rPr lang="en-GB" dirty="0" smtClean="0"/>
+              <a:t>But you should also bear in mind that the amount of time you take to implement all of this may not provide a good return on investment.</a:t>
+            </a:r>
+          </a:p>
+          <a:p>
+            <a:r>
+              <a:rPr lang="en-GB" dirty="0" smtClean="0"/>
+              <a:t>Even over five years. </a:t>
+            </a:r>
+          </a:p>
+          <a:p>
+            <a:endParaRPr lang="en-GB" dirty="0" smtClean="0"/>
+          </a:p>
+          <a:p>
+            <a:r>
+              <a:rPr lang="en-GB" dirty="0" smtClean="0"/>
               <a:t>But you might get a half-decent conference talk out of it.</a:t>
             </a:r>
             <a:endParaRPr lang="en-GB" dirty="0"/>
@@ -2748,7 +2798,15 @@
           <a:p>
             <a:r>
               <a:rPr lang="en-GB" dirty="0" smtClean="0"/>
-              <a:t>Here’s mine.</a:t>
+              <a:t>Here’s </a:t>
+            </a:r>
+            <a:r>
+              <a:rPr lang="en-GB" dirty="0" err="1" smtClean="0"/>
+              <a:t>mine.If</a:t>
+            </a:r>
+            <a:r>
+              <a:rPr lang="en-GB" dirty="0" smtClean="0"/>
+              <a:t> you visit my home, this is what you'll see. My wife will also be quite surprised that you’re visiting and she'll be even more surprised that you only want to see the cutlery drawer.</a:t>
             </a:r>
           </a:p>
           <a:p>
@@ -2757,18 +2815,14 @@
           <a:p>
             <a:r>
               <a:rPr lang="en-GB" dirty="0" smtClean="0"/>
-              <a:t>Yes, it</a:t>
-            </a:r>
-            <a:r>
-              <a:rPr lang="en-GB" baseline="0" dirty="0" smtClean="0"/>
-              <a:t> could probably do with a decent amount of application of the “</a:t>
-            </a:r>
-            <a:r>
-              <a:rPr lang="en-GB" baseline="0" dirty="0" err="1" smtClean="0"/>
+              <a:t>Yes, it could probably do with a decent amount of application of the “</a:t>
+            </a:r>
+            <a:r>
+              <a:rPr lang="en-GB" dirty="0" err="1" smtClean="0"/>
               <a:t>group_by</a:t>
             </a:r>
             <a:r>
-              <a:rPr lang="en-GB" baseline="0" dirty="0" smtClean="0"/>
+              <a:rPr lang="en-GB" dirty="0" smtClean="0"/>
               <a:t>”, “gather” and “arrange” functions.</a:t>
             </a:r>
             <a:endParaRPr lang="en-GB" dirty="0"/>
@@ -2858,12 +2912,8 @@
               <a:t> and a laptop then basically everything else can get chucked into a big bucket labelled “</a:t>
             </a:r>
             <a:r>
-              <a:rPr lang="en-GB" baseline="0" dirty="0" err="1" smtClean="0"/>
-              <a:t>Misc</a:t>
-            </a:r>
-            <a:r>
               <a:rPr lang="en-GB" baseline="0" dirty="0" smtClean="0"/>
-              <a:t>”.</a:t>
+              <a:t>Miscellaneous”.</a:t>
             </a:r>
             <a:endParaRPr lang="en-GB" dirty="0"/>
           </a:p>
@@ -2928,15 +2978,7 @@
           <a:p>
             <a:r>
               <a:rPr lang="en-GB" dirty="0" smtClean="0"/>
-              <a:t>Here’s a quote from Chris Atherton,</a:t>
-            </a:r>
-            <a:r>
-              <a:rPr lang="en-GB" baseline="0" dirty="0" smtClean="0"/>
-              <a:t> who has a PhD in neuroscience and was until fairly recently an academic working in the field of cognitive load</a:t>
-            </a:r>
-            <a:r>
-              <a:rPr lang="en-GB" baseline="0" dirty="0" smtClean="0"/>
-              <a:t>.</a:t>
+              <a:t>My brain is shallow, lazy and easily distracted. I hesitate to say that YOUR brain is also lazy, shallow and easily distracted but Joe Cheng stood up on the platform yesterday and said that our intuition sucked, so I'm going to go out on a limb and suggest that there MAY be others in the audience for whom this is true.</a:t>
             </a:r>
             <a:endParaRPr lang="en-GB" baseline="0" dirty="0" smtClean="0"/>
           </a:p>
@@ -3001,21 +3043,17 @@
           <a:p>
             <a:r>
               <a:rPr lang="en-GB" baseline="0" dirty="0" smtClean="0"/>
-              <a:t>OK, I’m </a:t>
+              <a:t>I’m assuming that if you’re at this conference then you’re likely to have seen this </a:t>
+            </a:r>
+            <a:r>
+              <a:rPr lang="en-GB" baseline="0" dirty="0" err="1" smtClean="0"/>
+              <a:t>diagram.There</a:t>
             </a:r>
             <a:r>
               <a:rPr lang="en-GB" baseline="0" dirty="0" smtClean="0"/>
-              <a:t>assuming that if you’re at this conference then you’re likely to have seen this diagram.</a:t>
-            </a:r>
-          </a:p>
-          <a:p>
+              <a:t> has been some recent discussion on the Not So Standard Deviations podcast about this diagram, which I think concluded with the agreement that this was a mental model and just a  “Theoretical” framework. I don’t have a problem with that definition. </a:t>
+            </a:r>
             <a:endParaRPr lang="en-GB" baseline="0" dirty="0" smtClean="0"/>
-          </a:p>
-          <a:p>
-            <a:r>
-              <a:rPr lang="en-GB" baseline="0" dirty="0" smtClean="0"/>
-              <a:t>There has been some recent discussion on the Not So Standard Deviations podcast about this diagram, which I think concluded with the agreement that this was a “Theoretical” framework. I don’t have a problem with that definition. </a:t>
-            </a:r>
           </a:p>
         </p:txBody>
       </p:sp>
@@ -4909,7 +4947,7 @@
           </a:ln>
           <a:extLst>
             <a:ext uri="{C572A759-6A51-4108-AA02-DFA0A04FC94B}">
-              <ma14:wrappingTextBoxFlag xmlns="" xmlns:m="http://schemas.openxmlformats.org/officeDocument/2006/math" xmlns:a14="http://schemas.microsoft.com/office/drawing/2010/main" xmlns:ma14="http://schemas.microsoft.com/office/mac/drawingml/2011/main" val="1"/>
+              <ma14:wrappingTextBoxFlag xmlns:ma14="http://schemas.microsoft.com/office/mac/drawingml/2011/main" xmlns:a14="http://schemas.microsoft.com/office/drawing/2010/main" xmlns:m="http://schemas.openxmlformats.org/officeDocument/2006/math" xmlns="" val="1"/>
             </a:ext>
           </a:extLst>
         </p:spPr>
@@ -4948,7 +4986,7 @@
           </a:ln>
           <a:extLst>
             <a:ext uri="{C572A759-6A51-4108-AA02-DFA0A04FC94B}">
-              <ma14:wrappingTextBoxFlag xmlns="" xmlns:m="http://schemas.openxmlformats.org/officeDocument/2006/math" xmlns:a14="http://schemas.microsoft.com/office/drawing/2010/main" xmlns:ma14="http://schemas.microsoft.com/office/mac/drawingml/2011/main" val="1"/>
+              <ma14:wrappingTextBoxFlag xmlns:ma14="http://schemas.microsoft.com/office/mac/drawingml/2011/main" xmlns:a14="http://schemas.microsoft.com/office/drawing/2010/main" xmlns:m="http://schemas.openxmlformats.org/officeDocument/2006/math" xmlns="" val="1"/>
             </a:ext>
           </a:extLst>
         </p:spPr>
@@ -8400,7 +8438,7 @@
       </p:sp>
       <p:pic>
         <p:nvPicPr>
-          <p:cNvPr id="2" name="Picture 1"/>
+          <p:cNvPr id="2" name="Picture 1" title="rmarkdown hex sticker image"/>
           <p:cNvPicPr>
             <a:picLocks noChangeAspect="1"/>
           </p:cNvPicPr>
@@ -8430,7 +8468,7 @@
       </p:pic>
       <p:pic>
         <p:nvPicPr>
-          <p:cNvPr id="3" name="Picture 2"/>
+          <p:cNvPr id="3" name="Picture 2" title="knitr hex sticker image"/>
           <p:cNvPicPr>
             <a:picLocks noChangeAspect="1"/>
           </p:cNvPicPr>
@@ -8674,7 +8712,7 @@
       </p:sp>
       <p:pic>
         <p:nvPicPr>
-          <p:cNvPr id="6146" name="Picture 2"/>
+          <p:cNvPr id="6146" name="Picture 2" descr="Tweet saying &quot;My opinion: If you write more comments (explanation) than code, use rmarkdown. If you write more code than comments, then write more comments and use rmarkdown. Tweet mentions StatGarrett and has the hashtag earlconf for the EARL conference in London 2018." title="Tweet from MikeKSmith including Garrett Grolemund"/>
           <p:cNvPicPr>
             <a:picLocks noChangeAspect="1" noChangeArrowheads="1"/>
           </p:cNvPicPr>
@@ -9424,19 +9462,11 @@
             </a:pPr>
             <a:r>
               <a:rPr dirty="0" smtClean="0"/>
-              <a:t>Clinical </a:t>
-            </a:r>
-            <a:r>
-              <a:rPr dirty="0" smtClean="0"/>
-              <a:t>Pharmacologist</a:t>
+              <a:t>Clinical Pharmacologist</a:t>
             </a:r>
             <a:r>
               <a:rPr lang="en-GB" dirty="0" smtClean="0"/>
-              <a:t>s </a:t>
-            </a:r>
-            <a:r>
-              <a:rPr lang="en-GB" dirty="0" smtClean="0"/>
-              <a:t>(including my manager)</a:t>
+              <a:t>s (including my manager)</a:t>
             </a:r>
             <a:endParaRPr dirty="0" smtClean="0"/>
           </a:p>
@@ -9670,7 +9700,7 @@
       </p:grpSpPr>
       <p:pic>
         <p:nvPicPr>
-          <p:cNvPr id="1027" name="Picture 3"/>
+          <p:cNvPr id="1027" name="Picture 3" descr="The screen capture shows the YAML header of an rmarkdown report. A box highlights the params input which has a variable called endpoint which has the default value of HAMDTL17 but other choices includign HAMDTL17, HAMATOTL and PGIIMP. There is another variable called quantAudience which is boolean." title="Screengrab of YAML header showing parameters "/>
           <p:cNvPicPr>
             <a:picLocks noChangeAspect="1" noChangeArrowheads="1"/>
           </p:cNvPicPr>
@@ -10184,7 +10214,7 @@
       </p:sp>
       <p:pic>
         <p:nvPicPr>
-          <p:cNvPr id="4" name="Picture 3"/>
+          <p:cNvPr id="4" name="Picture 3" descr="The screengrab shows the dialogue box that opens when the user selects to knit the document. There is an option highlighted saying knit with parameters." title="Screengrab of knitting the rmarkdown report with parameters"/>
           <p:cNvPicPr>
             <a:picLocks noChangeAspect="1"/>
           </p:cNvPicPr>
@@ -10273,7 +10303,7 @@
       </p:sp>
       <p:pic>
         <p:nvPicPr>
-          <p:cNvPr id="5" name="Picture 4"/>
+          <p:cNvPr id="5" name="Picture 4" descr="The screengrab shows the knit with parameters selection box which has three radio buttons, one for each endpoint choice and a check box for the quantAudience parameter" title="Screengrab showing parameter options"/>
           <p:cNvPicPr>
             <a:picLocks noChangeAspect="1"/>
           </p:cNvPicPr>
@@ -10340,7 +10370,7 @@
       </p:grpSpPr>
       <p:pic>
         <p:nvPicPr>
-          <p:cNvPr id="7170" name="Picture 2"/>
+          <p:cNvPr id="7170" name="Picture 2" descr="The screengrab shows how the parameter endpoint HAMDTL17 has been used in textual elements throughout the report. Appearances in text, graph titles and axes labels are highlighted." title="Screengrab of rendered HTML report"/>
           <p:cNvPicPr>
             <a:picLocks noChangeAspect="1" noChangeArrowheads="1"/>
           </p:cNvPicPr>
@@ -11199,7 +11229,7 @@
       </p:grpSpPr>
       <p:grpSp>
         <p:nvGrpSpPr>
-          <p:cNvPr id="2" name="Group 1"/>
+          <p:cNvPr id="2" name="Group 1" descr="The screengrab shows markdown code and a knitr chunk showing how parameters can be used within code. An statement is highlighted showing an if statement which computes using the boolean quantAudience parameter to control knitr chunk options, turning off the option to show code if the quantAudience parameter is FALSE." title="Screengrab of knitr code showing use of parameters in chunks"/>
           <p:cNvGrpSpPr/>
           <p:nvPr/>
         </p:nvGrpSpPr>
@@ -11518,7 +11548,7 @@
       </p:grpSpPr>
       <p:grpSp>
         <p:nvGrpSpPr>
-          <p:cNvPr id="28" name="Group 27"/>
+          <p:cNvPr id="28" name="Group 27" descr="The screengrab shows using the dplyr rename_all function replacing the endpoint parameter name with the text &quot;outcome&quot;. " title="Screengrab showing renaming data variables using endpoint parameter"/>
           <p:cNvGrpSpPr/>
           <p:nvPr/>
         </p:nvGrpSpPr>
@@ -11668,7 +11698,7 @@
       </p:grpSp>
       <p:grpSp>
         <p:nvGrpSpPr>
-          <p:cNvPr id="26" name="Group 25"/>
+          <p:cNvPr id="26" name="Group 25" descr="The screengrab shows using the quantAudience boolean parameter with the knitr chunk option eval. " title="Screengrab showing use of the quantAudience parameter in chunk options"/>
           <p:cNvGrpSpPr/>
           <p:nvPr/>
         </p:nvGrpSpPr>
@@ -12029,7 +12059,7 @@
       </p:grpSp>
       <p:grpSp>
         <p:nvGrpSpPr>
-          <p:cNvPr id="21" name="Group 20"/>
+          <p:cNvPr id="21" name="Group 20" descr="The screengrab shows using knitr chunk options eval with a child documents. eval is set to the boolean parameter quantAudience and a child document is set to &quot;DataManipulation_text.Rmd&quot;" title="Screengrab showing how child documents are included"/>
           <p:cNvGrpSpPr/>
           <p:nvPr/>
         </p:nvGrpSpPr>
@@ -12809,7 +12839,7 @@
       </p:sp>
       <p:pic>
         <p:nvPicPr>
-          <p:cNvPr id="5" name="Picture 2"/>
+          <p:cNvPr id="5" name="Picture 2" descr="The Screengrab shows a rendered HTML report for a quantitative audience showing that code is visible, a dataset is shown and child document text is included." title="Screengrab showing quantAudience rendered HTML"/>
           <p:cNvPicPr>
             <a:picLocks noChangeAspect="1" noChangeArrowheads="1"/>
           </p:cNvPicPr>
@@ -13666,7 +13696,7 @@
       </p:sp>
       <p:pic>
         <p:nvPicPr>
-          <p:cNvPr id="5" name="Picture 2"/>
+          <p:cNvPr id="5" name="Picture 2" descr="The screengrab shows the rendered report in RStudio Connect. There is a highlighted sliding box called &quot;Input&quot; where users input parameters. There is also a highlighted drop-down box at the top marked &quot;HAMDTL17 quantitative audience&quot; where pre-rendered and saved reports are easily accessible." title="Screengrab of RStudio Connect presentation of rendered report"/>
           <p:cNvPicPr>
             <a:picLocks noChangeAspect="1" noChangeArrowheads="1"/>
           </p:cNvPicPr>
@@ -14594,14 +14624,7 @@
                 <a:latin typeface="Courier New" panose="02070309020205020404" pitchFamily="49" charset="0"/>
                 <a:cs typeface="Courier New" panose="02070309020205020404" pitchFamily="49" charset="0"/>
               </a:rPr>
-              <a:t>render</a:t>
-            </a:r>
-            <a:r>
-              <a:rPr lang="en-GB" b="1" dirty="0" smtClean="0">
-                <a:latin typeface="Courier New" panose="02070309020205020404" pitchFamily="49" charset="0"/>
-                <a:cs typeface="Courier New" panose="02070309020205020404" pitchFamily="49" charset="0"/>
-              </a:rPr>
-              <a:t>(… , </a:t>
+              <a:t>render(… , </a:t>
             </a:r>
             <a:r>
               <a:rPr lang="en-GB" b="1" dirty="0" err="1" smtClean="0">
@@ -14840,7 +14863,7 @@
       </p:sp>
       <p:pic>
         <p:nvPicPr>
-          <p:cNvPr id="122" name="cutlery_Hadley.jpg" descr="cutlery_Hadley.jpg"/>
+          <p:cNvPr id="122" name="cutlery_Hadley.jpg" descr="A very neat cutlery drawer with knives arranged on the left, large forks next, smaller forks after that, teaspoons, then desert spoons and finally steak knieves on the far right. There are stirrers and metal straws along the top." title="Hadley Wickham's cutlery drawer"/>
           <p:cNvPicPr>
             <a:picLocks noChangeAspect="1"/>
           </p:cNvPicPr>
@@ -14869,7 +14892,7 @@
       </p:pic>
       <p:pic>
         <p:nvPicPr>
-          <p:cNvPr id="123" name="cutlery_JimHester.jpg" descr="cutlery_JimHester.jpg"/>
+          <p:cNvPr id="123" name="cutlery_JimHester.jpg" descr="Another very neat cutlery drawer. Large forks are arranged on the left, followed by smaller forks, teaspoons, desert spoons and finally knives. Miscellaneous items of cutlery are arranged in the top slot including a cheese parer." title="Jim Hester's cutlery drawer"/>
           <p:cNvPicPr>
             <a:picLocks noChangeAspect="1"/>
           </p:cNvPicPr>
@@ -14899,7 +14922,7 @@
       </p:pic>
       <p:pic>
         <p:nvPicPr>
-          <p:cNvPr id="124" name="cutlery_Mara.jpg" descr="cutlery_Mara.jpg"/>
+          <p:cNvPr id="124" name="cutlery_Mara.jpg" descr="Mara's cutlery drawer is not quite as neat as Hadley's or Jim's but is well organised. She has forks arranged on the left, teaspoons in the middle and knives on the right. Desert spoons are in the slot on the top. Mara tells me she arranges her cutlery according to frequency of use." title="Mara Averick's cutlery drawer"/>
           <p:cNvPicPr>
             <a:picLocks noChangeAspect="1"/>
           </p:cNvPicPr>
@@ -15153,7 +15176,7 @@
       </p:grpSpPr>
       <p:pic>
         <p:nvPicPr>
-          <p:cNvPr id="163" name="is_it_worth_the_time.png" descr="is_it_worth_the_time.png"/>
+          <p:cNvPr id="163" name="is_it_worth_the_time.png" descr="There is a matrix of boxes showing how much time you should spend on a given task, where the columns represent how often you do the task (ranging from 50 times per day to yearly) and how much time you shave off the task (ranging from 1 second to 1 day)." title="XKCD cartoon - &quot;Is it worth the time&quot;"/>
           <p:cNvPicPr>
             <a:picLocks noChangeAspect="1"/>
           </p:cNvPicPr>
@@ -15320,11 +15343,7 @@
             </a:br>
             <a:r>
               <a:rPr lang="en-GB" dirty="0" smtClean="0"/>
-              <a:t>but remember</a:t>
-            </a:r>
-            <a:r>
-              <a:rPr lang="en-GB" dirty="0" smtClean="0"/>
-              <a:t>….</a:t>
+              <a:t>but remember….</a:t>
             </a:r>
             <a:br>
               <a:rPr lang="en-GB" dirty="0" smtClean="0"/>
@@ -15515,7 +15534,7 @@
       </p:sp>
       <p:pic>
         <p:nvPicPr>
-          <p:cNvPr id="6" name="cutlery_MKS.jpg" descr="cutlery_MKS.jpg"/>
+          <p:cNvPr id="6" name="cutlery_MKS.jpg" descr="The earlier image of Mike Smith's messy cutlery drawer." title="Mike Smith's cutlery drawer"/>
           <p:cNvPicPr>
             <a:picLocks noChangeAspect="1"/>
           </p:cNvPicPr>
@@ -15721,7 +15740,7 @@
       </p:sp>
       <p:pic>
         <p:nvPicPr>
-          <p:cNvPr id="127" name="cutlery_MKS.jpg" descr="cutlery_MKS.jpg"/>
+          <p:cNvPr id="127" name="cutlery_MKS.jpg" descr="This cutlery drawer is a mess. There are different cutlery sets all mixed together. Items are not well organised at all. There is a large area to the right of a small cutlery organiser where there are forks, spoons, knives, scissors, a yellow, plastic figure from a child's toy." title="Mike Smith's cutlery drawer"/>
           <p:cNvPicPr>
             <a:picLocks noChangeAspect="1"/>
           </p:cNvPicPr>
@@ -16257,7 +16276,7 @@
       </p:grpSpPr>
       <p:pic>
         <p:nvPicPr>
-          <p:cNvPr id="129" name="home_organization.png" descr="home_organization.png"/>
+          <p:cNvPr id="129" name="home_organization.png" descr="A figure sits in a bare room working on a laptop. On the right of the room a wifi router is plugged in. There is a huge box in the middle of the room marked &quot;miscellaneous&quot; and in it there are chairs, a broom, a mattress, a bookcase and a standard lamp." title="XKCD cartoon - Home Organization"/>
           <p:cNvPicPr>
             <a:picLocks noChangeAspect="1"/>
           </p:cNvPicPr>
@@ -16409,7 +16428,7 @@
           </a:ln>
           <a:extLst>
             <a:ext uri="{C572A759-6A51-4108-AA02-DFA0A04FC94B}">
-              <ma14:wrappingTextBoxFlag xmlns="" xmlns:m="http://schemas.openxmlformats.org/officeDocument/2006/math" xmlns:a14="http://schemas.microsoft.com/office/drawing/2010/main" xmlns:ma14="http://schemas.microsoft.com/office/mac/drawingml/2011/main" val="1"/>
+              <ma14:wrappingTextBoxFlag xmlns:ma14="http://schemas.microsoft.com/office/mac/drawingml/2011/main" xmlns:a14="http://schemas.microsoft.com/office/drawing/2010/main" xmlns:m="http://schemas.openxmlformats.org/officeDocument/2006/math" xmlns="" val="1"/>
             </a:ext>
           </a:extLst>
         </p:spPr>
@@ -16449,7 +16468,7 @@
           </a:ln>
           <a:extLst>
             <a:ext uri="{C572A759-6A51-4108-AA02-DFA0A04FC94B}">
-              <ma14:wrappingTextBoxFlag xmlns="" xmlns:m="http://schemas.openxmlformats.org/officeDocument/2006/math" xmlns:a14="http://schemas.microsoft.com/office/drawing/2010/main" xmlns:ma14="http://schemas.microsoft.com/office/mac/drawingml/2011/main" val="1"/>
+              <ma14:wrappingTextBoxFlag xmlns:ma14="http://schemas.microsoft.com/office/mac/drawingml/2011/main" xmlns:a14="http://schemas.microsoft.com/office/drawing/2010/main" xmlns:m="http://schemas.openxmlformats.org/officeDocument/2006/math" xmlns="" val="1"/>
             </a:ext>
           </a:extLst>
         </p:spPr>
@@ -16556,7 +16575,7 @@
       </p:sp>
       <p:pic>
         <p:nvPicPr>
-          <p:cNvPr id="4" name="Picture 3"/>
+          <p:cNvPr id="4" name="Picture 3" descr="The diagram shows the steps of Data Science as explained in the R for Data Science book. Steps start with Import, to Tidy and then an &quot;Understand&quot; cycle including Visualize, Transform and Model which then flows out to the Communicate step." title="R for Data Science diagram"/>
           <p:cNvPicPr>
             <a:picLocks noChangeAspect="1"/>
           </p:cNvPicPr>

</xml_diff>